<commit_message>
continued presentation and optimized road
</commit_message>
<xml_diff>
--- a/Presentation/Traffic-flow-modeling-and-analysis.pptx
+++ b/Presentation/Traffic-flow-modeling-and-analysis.pptx
@@ -7,6 +7,15 @@
   <p:sldIdLst>
     <p:sldId id="256" r:id="rId2"/>
     <p:sldId id="257" r:id="rId3"/>
+    <p:sldId id="258" r:id="rId4"/>
+    <p:sldId id="267" r:id="rId5"/>
+    <p:sldId id="261" r:id="rId6"/>
+    <p:sldId id="262" r:id="rId7"/>
+    <p:sldId id="259" r:id="rId8"/>
+    <p:sldId id="263" r:id="rId9"/>
+    <p:sldId id="264" r:id="rId10"/>
+    <p:sldId id="265" r:id="rId11"/>
+    <p:sldId id="266" r:id="rId12"/>
   </p:sldIdLst>
   <p:sldSz cx="12192000" cy="6858000"/>
   <p:notesSz cx="6858000" cy="9144000"/>
@@ -105,6 +114,11 @@
       </a:defRPr>
     </a:lvl9pPr>
   </p:defaultTextStyle>
+  <p:extLst>
+    <p:ext uri="{EFAFB233-063F-42B5-8137-9DF3F51BA10A}">
+      <p15:sldGuideLst xmlns:p15="http://schemas.microsoft.com/office/powerpoint/2012/main"/>
+    </p:ext>
+  </p:extLst>
 </p:presentation>
 </file>
 
@@ -255,7 +269,7 @@
           <a:p>
             <a:fld id="{2CE709E5-6494-42E6-9F3E-1EC649FF95E6}" type="datetimeFigureOut">
               <a:rPr lang="de-DE" smtClean="0"/>
-              <a:t>12.01.2021</a:t>
+              <a:t>17.01.2021</a:t>
             </a:fld>
             <a:endParaRPr lang="de-DE"/>
           </a:p>
@@ -453,7 +467,7 @@
           <a:p>
             <a:fld id="{2CE709E5-6494-42E6-9F3E-1EC649FF95E6}" type="datetimeFigureOut">
               <a:rPr lang="de-DE" smtClean="0"/>
-              <a:t>12.01.2021</a:t>
+              <a:t>17.01.2021</a:t>
             </a:fld>
             <a:endParaRPr lang="de-DE"/>
           </a:p>
@@ -661,7 +675,7 @@
           <a:p>
             <a:fld id="{2CE709E5-6494-42E6-9F3E-1EC649FF95E6}" type="datetimeFigureOut">
               <a:rPr lang="de-DE" smtClean="0"/>
-              <a:t>12.01.2021</a:t>
+              <a:t>17.01.2021</a:t>
             </a:fld>
             <a:endParaRPr lang="de-DE"/>
           </a:p>
@@ -859,7 +873,7 @@
           <a:p>
             <a:fld id="{2CE709E5-6494-42E6-9F3E-1EC649FF95E6}" type="datetimeFigureOut">
               <a:rPr lang="de-DE" smtClean="0"/>
-              <a:t>12.01.2021</a:t>
+              <a:t>17.01.2021</a:t>
             </a:fld>
             <a:endParaRPr lang="de-DE"/>
           </a:p>
@@ -1134,7 +1148,7 @@
           <a:p>
             <a:fld id="{2CE709E5-6494-42E6-9F3E-1EC649FF95E6}" type="datetimeFigureOut">
               <a:rPr lang="de-DE" smtClean="0"/>
-              <a:t>12.01.2021</a:t>
+              <a:t>17.01.2021</a:t>
             </a:fld>
             <a:endParaRPr lang="de-DE"/>
           </a:p>
@@ -1399,7 +1413,7 @@
           <a:p>
             <a:fld id="{2CE709E5-6494-42E6-9F3E-1EC649FF95E6}" type="datetimeFigureOut">
               <a:rPr lang="de-DE" smtClean="0"/>
-              <a:t>12.01.2021</a:t>
+              <a:t>17.01.2021</a:t>
             </a:fld>
             <a:endParaRPr lang="de-DE"/>
           </a:p>
@@ -1811,7 +1825,7 @@
           <a:p>
             <a:fld id="{2CE709E5-6494-42E6-9F3E-1EC649FF95E6}" type="datetimeFigureOut">
               <a:rPr lang="de-DE" smtClean="0"/>
-              <a:t>12.01.2021</a:t>
+              <a:t>17.01.2021</a:t>
             </a:fld>
             <a:endParaRPr lang="de-DE"/>
           </a:p>
@@ -1952,7 +1966,7 @@
           <a:p>
             <a:fld id="{2CE709E5-6494-42E6-9F3E-1EC649FF95E6}" type="datetimeFigureOut">
               <a:rPr lang="de-DE" smtClean="0"/>
-              <a:t>12.01.2021</a:t>
+              <a:t>17.01.2021</a:t>
             </a:fld>
             <a:endParaRPr lang="de-DE"/>
           </a:p>
@@ -2065,7 +2079,7 @@
           <a:p>
             <a:fld id="{2CE709E5-6494-42E6-9F3E-1EC649FF95E6}" type="datetimeFigureOut">
               <a:rPr lang="de-DE" smtClean="0"/>
-              <a:t>12.01.2021</a:t>
+              <a:t>17.01.2021</a:t>
             </a:fld>
             <a:endParaRPr lang="de-DE"/>
           </a:p>
@@ -2376,7 +2390,7 @@
           <a:p>
             <a:fld id="{2CE709E5-6494-42E6-9F3E-1EC649FF95E6}" type="datetimeFigureOut">
               <a:rPr lang="de-DE" smtClean="0"/>
-              <a:t>12.01.2021</a:t>
+              <a:t>17.01.2021</a:t>
             </a:fld>
             <a:endParaRPr lang="de-DE"/>
           </a:p>
@@ -2664,7 +2678,7 @@
           <a:p>
             <a:fld id="{2CE709E5-6494-42E6-9F3E-1EC649FF95E6}" type="datetimeFigureOut">
               <a:rPr lang="de-DE" smtClean="0"/>
-              <a:t>12.01.2021</a:t>
+              <a:t>17.01.2021</a:t>
             </a:fld>
             <a:endParaRPr lang="de-DE"/>
           </a:p>
@@ -2905,7 +2919,7 @@
           <a:p>
             <a:fld id="{2CE709E5-6494-42E6-9F3E-1EC649FF95E6}" type="datetimeFigureOut">
               <a:rPr lang="de-DE" smtClean="0"/>
-              <a:t>12.01.2021</a:t>
+              <a:t>17.01.2021</a:t>
             </a:fld>
             <a:endParaRPr lang="de-DE"/>
           </a:p>
@@ -3468,12 +3482,12 @@
           <a:lstStyle/>
           <a:p>
             <a:r>
-              <a:rPr lang="de-DE">
+              <a:rPr lang="de-DE" dirty="0">
                 <a:solidFill>
                   <a:srgbClr val="FFFFFF"/>
                 </a:solidFill>
               </a:rPr>
-              <a:t>Traffic flow modeling and analysis</a:t>
+              <a:t>Traffic Flow Modeling and Analysis</a:t>
             </a:r>
           </a:p>
         </p:txBody>
@@ -3567,6 +3581,1225 @@
   </p:cSld>
   <p:clrMapOvr>
     <a:overrideClrMapping bg1="dk1" tx1="lt1" bg2="dk2" tx2="lt2" accent1="accent1" accent2="accent2" accent3="accent3" accent4="accent4" accent5="accent5" accent6="accent6" hlink="hlink" folHlink="folHlink"/>
+  </p:clrMapOvr>
+</p:sld>
+</file>
+
+<file path=ppt/slides/slide10.xml><?xml version="1.0" encoding="utf-8"?>
+<p:sld xmlns:a="http://schemas.openxmlformats.org/drawingml/2006/main" xmlns:r="http://schemas.openxmlformats.org/officeDocument/2006/relationships" xmlns:p="http://schemas.openxmlformats.org/presentationml/2006/main">
+  <p:cSld>
+    <p:bg>
+      <p:bgPr>
+        <a:solidFill>
+          <a:schemeClr val="bg1"/>
+        </a:solidFill>
+        <a:effectLst/>
+      </p:bgPr>
+    </p:bg>
+    <p:spTree>
+      <p:nvGrpSpPr>
+        <p:cNvPr id="1" name=""/>
+        <p:cNvGrpSpPr/>
+        <p:nvPr/>
+      </p:nvGrpSpPr>
+      <p:grpSpPr>
+        <a:xfrm>
+          <a:off x="0" y="0"/>
+          <a:ext cx="0" cy="0"/>
+          <a:chOff x="0" y="0"/>
+          <a:chExt cx="0" cy="0"/>
+        </a:xfrm>
+      </p:grpSpPr>
+      <p:sp>
+        <p:nvSpPr>
+          <p:cNvPr id="9" name="Rectangle 8">
+            <a:extLst>
+              <a:ext uri="{FF2B5EF4-FFF2-40B4-BE49-F238E27FC236}">
+                <a16:creationId xmlns:a16="http://schemas.microsoft.com/office/drawing/2014/main" id="{71FC7D98-7B8B-402A-90FC-F027482F2142}"/>
+              </a:ext>
+              <a:ext uri="{C183D7F6-B498-43B3-948B-1728B52AA6E4}">
+                <adec:decorative xmlns:adec="http://schemas.microsoft.com/office/drawing/2017/decorative" val="1"/>
+              </a:ext>
+            </a:extLst>
+          </p:cNvPr>
+          <p:cNvSpPr>
+            <a:spLocks noGrp="1" noRot="1" noChangeAspect="1" noMove="1" noResize="1" noEditPoints="1" noAdjustHandles="1" noChangeArrowheads="1" noChangeShapeType="1" noTextEdit="1"/>
+          </p:cNvSpPr>
+          <p:nvPr>
+            <p:extLst>
+              <p:ext uri="{386F3935-93C4-4BCD-93E2-E3B085C9AB24}">
+                <p16:designElem xmlns:p16="http://schemas.microsoft.com/office/powerpoint/2015/main" val="1"/>
+              </p:ext>
+            </p:extLst>
+          </p:nvPr>
+        </p:nvSpPr>
+        <p:spPr>
+          <a:xfrm>
+            <a:off x="4625926" y="0"/>
+            <a:ext cx="7566074" cy="6858000"/>
+          </a:xfrm>
+          <a:prstGeom prst="rect">
+            <a:avLst/>
+          </a:prstGeom>
+          <a:solidFill>
+            <a:srgbClr val="C8CACA"/>
+          </a:solidFill>
+          <a:ln>
+            <a:noFill/>
+          </a:ln>
+        </p:spPr>
+        <p:style>
+          <a:lnRef idx="2">
+            <a:schemeClr val="accent1">
+              <a:shade val="50000"/>
+            </a:schemeClr>
+          </a:lnRef>
+          <a:fillRef idx="1">
+            <a:schemeClr val="accent1"/>
+          </a:fillRef>
+          <a:effectRef idx="0">
+            <a:schemeClr val="accent1"/>
+          </a:effectRef>
+          <a:fontRef idx="minor">
+            <a:schemeClr val="lt1"/>
+          </a:fontRef>
+        </p:style>
+        <p:txBody>
+          <a:bodyPr rtlCol="0" anchor="ctr"/>
+          <a:lstStyle/>
+          <a:p>
+            <a:pPr algn="ctr"/>
+            <a:endParaRPr lang="en-US"/>
+          </a:p>
+        </p:txBody>
+      </p:sp>
+      <p:sp>
+        <p:nvSpPr>
+          <p:cNvPr id="11" name="Rounded Rectangle 28">
+            <a:extLst>
+              <a:ext uri="{FF2B5EF4-FFF2-40B4-BE49-F238E27FC236}">
+                <a16:creationId xmlns:a16="http://schemas.microsoft.com/office/drawing/2014/main" id="{AD7356EA-285B-4E5D-8FEC-104659A4FD2C}"/>
+              </a:ext>
+              <a:ext uri="{C183D7F6-B498-43B3-948B-1728B52AA6E4}">
+                <adec:decorative xmlns:adec="http://schemas.microsoft.com/office/drawing/2017/decorative" val="1"/>
+              </a:ext>
+            </a:extLst>
+          </p:cNvPr>
+          <p:cNvSpPr>
+            <a:spLocks noGrp="1" noRot="1" noChangeAspect="1" noMove="1" noResize="1" noEditPoints="1" noAdjustHandles="1" noChangeArrowheads="1" noChangeShapeType="1" noTextEdit="1"/>
+          </p:cNvSpPr>
+          <p:nvPr>
+            <p:extLst>
+              <p:ext uri="{386F3935-93C4-4BCD-93E2-E3B085C9AB24}">
+                <p16:designElem xmlns:p16="http://schemas.microsoft.com/office/powerpoint/2015/main" val="1"/>
+              </p:ext>
+            </p:extLst>
+          </p:nvPr>
+        </p:nvSpPr>
+        <p:spPr>
+          <a:xfrm>
+            <a:off x="5275903" y="640091"/>
+            <a:ext cx="6266120" cy="5577818"/>
+          </a:xfrm>
+          <a:prstGeom prst="roundRect">
+            <a:avLst>
+              <a:gd name="adj" fmla="val 0"/>
+            </a:avLst>
+          </a:prstGeom>
+          <a:solidFill>
+            <a:srgbClr val="FFFFFF"/>
+          </a:solidFill>
+          <a:ln w="9525">
+            <a:solidFill>
+              <a:srgbClr val="C8CACA"/>
+            </a:solidFill>
+          </a:ln>
+          <a:effectLst>
+            <a:outerShdw blurRad="57150" dist="19050" dir="5400000" algn="t" rotWithShape="0">
+              <a:prstClr val="black">
+                <a:alpha val="63000"/>
+              </a:prstClr>
+            </a:outerShdw>
+          </a:effectLst>
+        </p:spPr>
+        <p:style>
+          <a:lnRef idx="2">
+            <a:schemeClr val="accent1">
+              <a:shade val="50000"/>
+            </a:schemeClr>
+          </a:lnRef>
+          <a:fillRef idx="1">
+            <a:schemeClr val="accent1"/>
+          </a:fillRef>
+          <a:effectRef idx="0">
+            <a:schemeClr val="accent1"/>
+          </a:effectRef>
+          <a:fontRef idx="minor">
+            <a:schemeClr val="lt1"/>
+          </a:fontRef>
+        </p:style>
+        <p:txBody>
+          <a:bodyPr rtlCol="0" anchor="ctr"/>
+          <a:lstStyle/>
+          <a:p>
+            <a:pPr algn="ctr"/>
+            <a:endParaRPr lang="en-US"/>
+          </a:p>
+        </p:txBody>
+      </p:sp>
+      <p:pic>
+        <p:nvPicPr>
+          <p:cNvPr id="4" name="Inhaltsplatzhalter 3">
+            <a:extLst>
+              <a:ext uri="{FF2B5EF4-FFF2-40B4-BE49-F238E27FC236}">
+                <a16:creationId xmlns:a16="http://schemas.microsoft.com/office/drawing/2014/main" id="{F3D7B3FC-9522-437C-91B0-607EA8EFE213}"/>
+              </a:ext>
+            </a:extLst>
+          </p:cNvPr>
+          <p:cNvPicPr>
+            <a:picLocks noGrp="1" noChangeAspect="1"/>
+          </p:cNvPicPr>
+          <p:nvPr>
+            <p:ph idx="1"/>
+          </p:nvPr>
+        </p:nvPicPr>
+        <p:blipFill rotWithShape="1">
+          <a:blip r:embed="rId2"/>
+          <a:srcRect r="34423" b="2"/>
+          <a:stretch/>
+        </p:blipFill>
+        <p:spPr>
+          <a:xfrm>
+            <a:off x="5441735" y="804672"/>
+            <a:ext cx="5934456" cy="5248656"/>
+          </a:xfrm>
+          <a:prstGeom prst="rect">
+            <a:avLst/>
+          </a:prstGeom>
+          <a:effectLst/>
+        </p:spPr>
+      </p:pic>
+      <p:sp>
+        <p:nvSpPr>
+          <p:cNvPr id="7" name="Inhaltsplatzhalter 2">
+            <a:extLst>
+              <a:ext uri="{FF2B5EF4-FFF2-40B4-BE49-F238E27FC236}">
+                <a16:creationId xmlns:a16="http://schemas.microsoft.com/office/drawing/2014/main" id="{61A60322-5AB8-4FFA-A427-452CB30E013C}"/>
+              </a:ext>
+            </a:extLst>
+          </p:cNvPr>
+          <p:cNvSpPr txBox="1">
+            <a:spLocks/>
+          </p:cNvSpPr>
+          <p:nvPr/>
+        </p:nvSpPr>
+        <p:spPr>
+          <a:xfrm>
+            <a:off x="417910" y="1143000"/>
+            <a:ext cx="3883027" cy="5074909"/>
+          </a:xfrm>
+          <a:prstGeom prst="rect">
+            <a:avLst/>
+          </a:prstGeom>
+        </p:spPr>
+        <p:txBody>
+          <a:bodyPr vert="horz" lIns="91440" tIns="45720" rIns="91440" bIns="45720" rtlCol="0">
+            <a:normAutofit/>
+          </a:bodyPr>
+          <a:lstStyle>
+            <a:lvl1pPr marL="228600" indent="-228600" algn="l" defTabSz="914400" rtl="0" eaLnBrk="1" latinLnBrk="0" hangingPunct="1">
+              <a:lnSpc>
+                <a:spcPct val="90000"/>
+              </a:lnSpc>
+              <a:spcBef>
+                <a:spcPts val="1000"/>
+              </a:spcBef>
+              <a:buFont typeface="Arial" panose="020B0604020202020204" pitchFamily="34" charset="0"/>
+              <a:buChar char="•"/>
+              <a:defRPr sz="2800" kern="1200">
+                <a:solidFill>
+                  <a:schemeClr val="tx1"/>
+                </a:solidFill>
+                <a:latin typeface="+mn-lt"/>
+                <a:ea typeface="+mn-ea"/>
+                <a:cs typeface="+mn-cs"/>
+              </a:defRPr>
+            </a:lvl1pPr>
+            <a:lvl2pPr marL="685800" indent="-228600" algn="l" defTabSz="914400" rtl="0" eaLnBrk="1" latinLnBrk="0" hangingPunct="1">
+              <a:lnSpc>
+                <a:spcPct val="90000"/>
+              </a:lnSpc>
+              <a:spcBef>
+                <a:spcPts val="500"/>
+              </a:spcBef>
+              <a:buFont typeface="Arial" panose="020B0604020202020204" pitchFamily="34" charset="0"/>
+              <a:buChar char="•"/>
+              <a:defRPr sz="2400" kern="1200">
+                <a:solidFill>
+                  <a:schemeClr val="tx1"/>
+                </a:solidFill>
+                <a:latin typeface="+mn-lt"/>
+                <a:ea typeface="+mn-ea"/>
+                <a:cs typeface="+mn-cs"/>
+              </a:defRPr>
+            </a:lvl2pPr>
+            <a:lvl3pPr marL="1143000" indent="-228600" algn="l" defTabSz="914400" rtl="0" eaLnBrk="1" latinLnBrk="0" hangingPunct="1">
+              <a:lnSpc>
+                <a:spcPct val="90000"/>
+              </a:lnSpc>
+              <a:spcBef>
+                <a:spcPts val="500"/>
+              </a:spcBef>
+              <a:buFont typeface="Arial" panose="020B0604020202020204" pitchFamily="34" charset="0"/>
+              <a:buChar char="•"/>
+              <a:defRPr sz="2000" kern="1200">
+                <a:solidFill>
+                  <a:schemeClr val="tx1"/>
+                </a:solidFill>
+                <a:latin typeface="+mn-lt"/>
+                <a:ea typeface="+mn-ea"/>
+                <a:cs typeface="+mn-cs"/>
+              </a:defRPr>
+            </a:lvl3pPr>
+            <a:lvl4pPr marL="1600200" indent="-228600" algn="l" defTabSz="914400" rtl="0" eaLnBrk="1" latinLnBrk="0" hangingPunct="1">
+              <a:lnSpc>
+                <a:spcPct val="90000"/>
+              </a:lnSpc>
+              <a:spcBef>
+                <a:spcPts val="500"/>
+              </a:spcBef>
+              <a:buFont typeface="Arial" panose="020B0604020202020204" pitchFamily="34" charset="0"/>
+              <a:buChar char="•"/>
+              <a:defRPr sz="1800" kern="1200">
+                <a:solidFill>
+                  <a:schemeClr val="tx1"/>
+                </a:solidFill>
+                <a:latin typeface="+mn-lt"/>
+                <a:ea typeface="+mn-ea"/>
+                <a:cs typeface="+mn-cs"/>
+              </a:defRPr>
+            </a:lvl4pPr>
+            <a:lvl5pPr marL="2057400" indent="-228600" algn="l" defTabSz="914400" rtl="0" eaLnBrk="1" latinLnBrk="0" hangingPunct="1">
+              <a:lnSpc>
+                <a:spcPct val="90000"/>
+              </a:lnSpc>
+              <a:spcBef>
+                <a:spcPts val="500"/>
+              </a:spcBef>
+              <a:buFont typeface="Arial" panose="020B0604020202020204" pitchFamily="34" charset="0"/>
+              <a:buChar char="•"/>
+              <a:defRPr sz="1800" kern="1200">
+                <a:solidFill>
+                  <a:schemeClr val="tx1"/>
+                </a:solidFill>
+                <a:latin typeface="+mn-lt"/>
+                <a:ea typeface="+mn-ea"/>
+                <a:cs typeface="+mn-cs"/>
+              </a:defRPr>
+            </a:lvl5pPr>
+            <a:lvl6pPr marL="2514600" indent="-228600" algn="l" defTabSz="914400" rtl="0" eaLnBrk="1" latinLnBrk="0" hangingPunct="1">
+              <a:lnSpc>
+                <a:spcPct val="90000"/>
+              </a:lnSpc>
+              <a:spcBef>
+                <a:spcPts val="500"/>
+              </a:spcBef>
+              <a:buFont typeface="Arial" panose="020B0604020202020204" pitchFamily="34" charset="0"/>
+              <a:buChar char="•"/>
+              <a:defRPr sz="1800" kern="1200">
+                <a:solidFill>
+                  <a:schemeClr val="tx1"/>
+                </a:solidFill>
+                <a:latin typeface="+mn-lt"/>
+                <a:ea typeface="+mn-ea"/>
+                <a:cs typeface="+mn-cs"/>
+              </a:defRPr>
+            </a:lvl6pPr>
+            <a:lvl7pPr marL="2971800" indent="-228600" algn="l" defTabSz="914400" rtl="0" eaLnBrk="1" latinLnBrk="0" hangingPunct="1">
+              <a:lnSpc>
+                <a:spcPct val="90000"/>
+              </a:lnSpc>
+              <a:spcBef>
+                <a:spcPts val="500"/>
+              </a:spcBef>
+              <a:buFont typeface="Arial" panose="020B0604020202020204" pitchFamily="34" charset="0"/>
+              <a:buChar char="•"/>
+              <a:defRPr sz="1800" kern="1200">
+                <a:solidFill>
+                  <a:schemeClr val="tx1"/>
+                </a:solidFill>
+                <a:latin typeface="+mn-lt"/>
+                <a:ea typeface="+mn-ea"/>
+                <a:cs typeface="+mn-cs"/>
+              </a:defRPr>
+            </a:lvl7pPr>
+            <a:lvl8pPr marL="3429000" indent="-228600" algn="l" defTabSz="914400" rtl="0" eaLnBrk="1" latinLnBrk="0" hangingPunct="1">
+              <a:lnSpc>
+                <a:spcPct val="90000"/>
+              </a:lnSpc>
+              <a:spcBef>
+                <a:spcPts val="500"/>
+              </a:spcBef>
+              <a:buFont typeface="Arial" panose="020B0604020202020204" pitchFamily="34" charset="0"/>
+              <a:buChar char="•"/>
+              <a:defRPr sz="1800" kern="1200">
+                <a:solidFill>
+                  <a:schemeClr val="tx1"/>
+                </a:solidFill>
+                <a:latin typeface="+mn-lt"/>
+                <a:ea typeface="+mn-ea"/>
+                <a:cs typeface="+mn-cs"/>
+              </a:defRPr>
+            </a:lvl8pPr>
+            <a:lvl9pPr marL="3886200" indent="-228600" algn="l" defTabSz="914400" rtl="0" eaLnBrk="1" latinLnBrk="0" hangingPunct="1">
+              <a:lnSpc>
+                <a:spcPct val="90000"/>
+              </a:lnSpc>
+              <a:spcBef>
+                <a:spcPts val="500"/>
+              </a:spcBef>
+              <a:buFont typeface="Arial" panose="020B0604020202020204" pitchFamily="34" charset="0"/>
+              <a:buChar char="•"/>
+              <a:defRPr sz="1800" kern="1200">
+                <a:solidFill>
+                  <a:schemeClr val="tx1"/>
+                </a:solidFill>
+                <a:latin typeface="+mn-lt"/>
+                <a:ea typeface="+mn-ea"/>
+                <a:cs typeface="+mn-cs"/>
+              </a:defRPr>
+            </a:lvl9pPr>
+          </a:lstStyle>
+          <a:p>
+            <a:r>
+              <a:rPr lang="en-US" sz="2000" dirty="0" err="1"/>
+              <a:t>Für</a:t>
+            </a:r>
+            <a:r>
+              <a:rPr lang="en-US" sz="2000" dirty="0"/>
+              <a:t> </a:t>
+            </a:r>
+            <a:r>
+              <a:rPr lang="en-US" sz="2000" dirty="0" err="1"/>
+              <a:t>jede</a:t>
+            </a:r>
+            <a:r>
+              <a:rPr lang="en-US" sz="2000" dirty="0"/>
+              <a:t> </a:t>
+            </a:r>
+            <a:r>
+              <a:rPr lang="en-US" sz="2000" dirty="0" err="1"/>
+              <a:t>Richtung</a:t>
+            </a:r>
+            <a:r>
+              <a:rPr lang="en-US" sz="2000" dirty="0"/>
+              <a:t> </a:t>
+            </a:r>
+            <a:r>
+              <a:rPr lang="en-US" sz="2000" dirty="0" err="1"/>
+              <a:t>gibt</a:t>
+            </a:r>
+            <a:r>
+              <a:rPr lang="en-US" sz="2000" dirty="0"/>
+              <a:t> es </a:t>
+            </a:r>
+            <a:r>
+              <a:rPr lang="en-US" sz="2000" dirty="0" err="1"/>
+              <a:t>einen</a:t>
+            </a:r>
+            <a:r>
+              <a:rPr lang="en-US" sz="2000" dirty="0"/>
+              <a:t> </a:t>
+            </a:r>
+            <a:r>
+              <a:rPr lang="en-US" sz="2000" dirty="0" err="1"/>
+              <a:t>solchen</a:t>
+            </a:r>
+            <a:r>
+              <a:rPr lang="en-US" sz="2000" dirty="0"/>
+              <a:t> Block</a:t>
+            </a:r>
+          </a:p>
+          <a:p>
+            <a:r>
+              <a:rPr lang="en-US" sz="2000" dirty="0" err="1"/>
+              <a:t>Hier</a:t>
+            </a:r>
+            <a:r>
+              <a:rPr lang="en-US" sz="2000" dirty="0"/>
+              <a:t> </a:t>
+            </a:r>
+            <a:r>
+              <a:rPr lang="en-US" sz="2000" dirty="0" err="1"/>
+              <a:t>wird</a:t>
+            </a:r>
+            <a:r>
+              <a:rPr lang="en-US" sz="2000" dirty="0"/>
+              <a:t> der Indicator </a:t>
+            </a:r>
+            <a:r>
+              <a:rPr lang="en-US" sz="2000" dirty="0" err="1"/>
+              <a:t>betrachtet</a:t>
+            </a:r>
+            <a:r>
+              <a:rPr lang="en-US" sz="2000" dirty="0"/>
+              <a:t> und </a:t>
+            </a:r>
+            <a:r>
+              <a:rPr lang="en-US" sz="2000" dirty="0" err="1"/>
+              <a:t>ob</a:t>
+            </a:r>
+            <a:r>
+              <a:rPr lang="en-US" sz="2000" dirty="0"/>
+              <a:t> von </a:t>
+            </a:r>
+            <a:r>
+              <a:rPr lang="en-US" sz="2000" dirty="0" err="1"/>
+              <a:t>anderen</a:t>
+            </a:r>
+            <a:r>
+              <a:rPr lang="en-US" sz="2000" dirty="0"/>
+              <a:t> </a:t>
+            </a:r>
+            <a:r>
+              <a:rPr lang="en-US" sz="2000" dirty="0" err="1"/>
+              <a:t>Richtungen</a:t>
+            </a:r>
+            <a:r>
+              <a:rPr lang="en-US" sz="2000" dirty="0"/>
+              <a:t> Autos </a:t>
+            </a:r>
+            <a:r>
+              <a:rPr lang="en-US" sz="2000" dirty="0" err="1"/>
+              <a:t>kommen</a:t>
+            </a:r>
+            <a:r>
+              <a:rPr lang="en-US" sz="2000" dirty="0"/>
+              <a:t>, die </a:t>
+            </a:r>
+            <a:r>
+              <a:rPr lang="en-US" sz="2000" dirty="0" err="1"/>
+              <a:t>eventuell</a:t>
+            </a:r>
+            <a:r>
+              <a:rPr lang="en-US" sz="2000" dirty="0"/>
+              <a:t> die </a:t>
+            </a:r>
+            <a:r>
+              <a:rPr lang="en-US" sz="2000" dirty="0" err="1"/>
+              <a:t>Vorfahrt</a:t>
+            </a:r>
+            <a:r>
+              <a:rPr lang="en-US" sz="2000" dirty="0"/>
+              <a:t> </a:t>
+            </a:r>
+            <a:r>
+              <a:rPr lang="en-US" sz="2000" dirty="0" err="1"/>
+              <a:t>beeinflussen</a:t>
+            </a:r>
+            <a:endParaRPr lang="en-US" sz="2000" dirty="0"/>
+          </a:p>
+          <a:p>
+            <a:r>
+              <a:rPr lang="en-US" sz="2000" dirty="0" err="1"/>
+              <a:t>Wenn</a:t>
+            </a:r>
+            <a:r>
+              <a:rPr lang="en-US" sz="2000" dirty="0"/>
+              <a:t> man </a:t>
+            </a:r>
+            <a:r>
+              <a:rPr lang="en-US" sz="2000" dirty="0" err="1"/>
+              <a:t>fahren</a:t>
+            </a:r>
+            <a:r>
+              <a:rPr lang="en-US" sz="2000" dirty="0"/>
+              <a:t> </a:t>
+            </a:r>
+            <a:r>
+              <a:rPr lang="en-US" sz="2000" dirty="0" err="1"/>
+              <a:t>darf</a:t>
+            </a:r>
+            <a:r>
+              <a:rPr lang="en-US" sz="2000" dirty="0"/>
+              <a:t>, </a:t>
+            </a:r>
+            <a:r>
+              <a:rPr lang="en-US" sz="2000" dirty="0" err="1"/>
+              <a:t>wird</a:t>
+            </a:r>
+            <a:r>
+              <a:rPr lang="en-US" sz="2000" dirty="0"/>
+              <a:t> das </a:t>
+            </a:r>
+            <a:r>
+              <a:rPr lang="en-US" sz="2000" dirty="0" err="1"/>
+              <a:t>entsprechende</a:t>
+            </a:r>
+            <a:r>
+              <a:rPr lang="en-US" sz="2000" dirty="0"/>
+              <a:t> Auto an den Output </a:t>
+            </a:r>
+            <a:r>
+              <a:rPr lang="en-US" sz="2000" dirty="0" err="1"/>
+              <a:t>gesendet</a:t>
+            </a:r>
+            <a:r>
+              <a:rPr lang="en-US" sz="2000" dirty="0"/>
+              <a:t> und von der Queue </a:t>
+            </a:r>
+            <a:r>
+              <a:rPr lang="en-US" sz="2000" dirty="0" err="1"/>
+              <a:t>ge-popt</a:t>
+            </a:r>
+            <a:endParaRPr lang="en-US" sz="2000" dirty="0"/>
+          </a:p>
+          <a:p>
+            <a:r>
+              <a:rPr lang="en-US" sz="2000" dirty="0" err="1"/>
+              <a:t>Gleiches</a:t>
+            </a:r>
+            <a:r>
+              <a:rPr lang="en-US" sz="2000" dirty="0"/>
+              <a:t> </a:t>
+            </a:r>
+            <a:r>
+              <a:rPr lang="en-US" sz="2000" dirty="0" err="1"/>
+              <a:t>Prinzip</a:t>
+            </a:r>
+            <a:r>
+              <a:rPr lang="en-US" sz="2000" dirty="0"/>
+              <a:t> </a:t>
+            </a:r>
+            <a:r>
+              <a:rPr lang="en-US" sz="2000" dirty="0" err="1"/>
+              <a:t>für</a:t>
+            </a:r>
+            <a:r>
+              <a:rPr lang="en-US" sz="2000" dirty="0"/>
+              <a:t> </a:t>
+            </a:r>
+            <a:r>
+              <a:rPr lang="en-US" sz="2000" dirty="0" err="1"/>
+              <a:t>eine</a:t>
+            </a:r>
+            <a:r>
+              <a:rPr lang="en-US" sz="2000" dirty="0"/>
+              <a:t> Cross-intersection </a:t>
+            </a:r>
+            <a:r>
+              <a:rPr lang="en-US" sz="2000" dirty="0" err="1"/>
+              <a:t>nur</a:t>
+            </a:r>
+            <a:r>
+              <a:rPr lang="en-US" sz="2000" dirty="0"/>
+              <a:t> </a:t>
+            </a:r>
+            <a:r>
+              <a:rPr lang="en-US" sz="2000" dirty="0" err="1"/>
+              <a:t>mit</a:t>
+            </a:r>
+            <a:r>
+              <a:rPr lang="en-US" sz="2000" dirty="0"/>
+              <a:t> </a:t>
+            </a:r>
+            <a:r>
+              <a:rPr lang="en-US" sz="2000" dirty="0" err="1"/>
+              <a:t>komplexerer</a:t>
+            </a:r>
+            <a:r>
+              <a:rPr lang="en-US" sz="2000" dirty="0"/>
+              <a:t> </a:t>
+            </a:r>
+            <a:r>
+              <a:rPr lang="en-US" sz="2000" dirty="0" err="1"/>
+              <a:t>Rechtsregel</a:t>
+            </a:r>
+            <a:r>
+              <a:rPr lang="en-US" sz="2000" dirty="0"/>
+              <a:t>, da </a:t>
+            </a:r>
+            <a:r>
+              <a:rPr lang="en-US" sz="2000" dirty="0" err="1"/>
+              <a:t>eine</a:t>
+            </a:r>
+            <a:r>
+              <a:rPr lang="en-US" sz="2000" dirty="0"/>
+              <a:t> </a:t>
+            </a:r>
+            <a:r>
+              <a:rPr lang="en-US" sz="2000" dirty="0" err="1"/>
+              <a:t>Richtung</a:t>
+            </a:r>
+            <a:r>
+              <a:rPr lang="en-US" sz="2000" dirty="0"/>
+              <a:t> </a:t>
+            </a:r>
+            <a:r>
+              <a:rPr lang="en-US" sz="2000" dirty="0" err="1"/>
+              <a:t>dazu</a:t>
+            </a:r>
+            <a:r>
+              <a:rPr lang="en-US" sz="2000" dirty="0"/>
+              <a:t> </a:t>
+            </a:r>
+            <a:r>
+              <a:rPr lang="en-US" sz="2000" dirty="0" err="1"/>
+              <a:t>kommt</a:t>
+            </a:r>
+            <a:endParaRPr lang="en-US" sz="2000" dirty="0"/>
+          </a:p>
+        </p:txBody>
+      </p:sp>
+    </p:spTree>
+    <p:extLst>
+      <p:ext uri="{BB962C8B-B14F-4D97-AF65-F5344CB8AC3E}">
+        <p14:creationId xmlns:p14="http://schemas.microsoft.com/office/powerpoint/2010/main" val="3967175924"/>
+      </p:ext>
+    </p:extLst>
+  </p:cSld>
+  <p:clrMapOvr>
+    <a:masterClrMapping/>
+  </p:clrMapOvr>
+</p:sld>
+</file>
+
+<file path=ppt/slides/slide11.xml><?xml version="1.0" encoding="utf-8"?>
+<p:sld xmlns:a="http://schemas.openxmlformats.org/drawingml/2006/main" xmlns:r="http://schemas.openxmlformats.org/officeDocument/2006/relationships" xmlns:p="http://schemas.openxmlformats.org/presentationml/2006/main">
+  <p:cSld>
+    <p:bg>
+      <p:bgPr>
+        <a:solidFill>
+          <a:schemeClr val="bg1"/>
+        </a:solidFill>
+        <a:effectLst/>
+      </p:bgPr>
+    </p:bg>
+    <p:spTree>
+      <p:nvGrpSpPr>
+        <p:cNvPr id="1" name=""/>
+        <p:cNvGrpSpPr/>
+        <p:nvPr/>
+      </p:nvGrpSpPr>
+      <p:grpSpPr>
+        <a:xfrm>
+          <a:off x="0" y="0"/>
+          <a:ext cx="0" cy="0"/>
+          <a:chOff x="0" y="0"/>
+          <a:chExt cx="0" cy="0"/>
+        </a:xfrm>
+      </p:grpSpPr>
+      <p:sp>
+        <p:nvSpPr>
+          <p:cNvPr id="2" name="Titel 1">
+            <a:extLst>
+              <a:ext uri="{FF2B5EF4-FFF2-40B4-BE49-F238E27FC236}">
+                <a16:creationId xmlns:a16="http://schemas.microsoft.com/office/drawing/2014/main" id="{073F535C-AB58-4FA4-907F-873955C67F74}"/>
+              </a:ext>
+            </a:extLst>
+          </p:cNvPr>
+          <p:cNvSpPr>
+            <a:spLocks noGrp="1"/>
+          </p:cNvSpPr>
+          <p:nvPr>
+            <p:ph type="title"/>
+          </p:nvPr>
+        </p:nvSpPr>
+        <p:spPr>
+          <a:xfrm>
+            <a:off x="645859" y="640081"/>
+            <a:ext cx="3494341" cy="960119"/>
+          </a:xfrm>
+          <a:noFill/>
+        </p:spPr>
+        <p:txBody>
+          <a:bodyPr vert="horz" lIns="91440" tIns="45720" rIns="91440" bIns="45720" rtlCol="0" anchor="b">
+            <a:normAutofit/>
+          </a:bodyPr>
+          <a:lstStyle/>
+          <a:p>
+            <a:r>
+              <a:rPr lang="en-US" sz="4600" dirty="0"/>
+              <a:t>Street</a:t>
+            </a:r>
+          </a:p>
+        </p:txBody>
+      </p:sp>
+      <p:sp>
+        <p:nvSpPr>
+          <p:cNvPr id="9" name="Rectangle 8">
+            <a:extLst>
+              <a:ext uri="{FF2B5EF4-FFF2-40B4-BE49-F238E27FC236}">
+                <a16:creationId xmlns:a16="http://schemas.microsoft.com/office/drawing/2014/main" id="{71FC7D98-7B8B-402A-90FC-F027482F2142}"/>
+              </a:ext>
+              <a:ext uri="{C183D7F6-B498-43B3-948B-1728B52AA6E4}">
+                <adec:decorative xmlns:adec="http://schemas.microsoft.com/office/drawing/2017/decorative" val="1"/>
+              </a:ext>
+            </a:extLst>
+          </p:cNvPr>
+          <p:cNvSpPr>
+            <a:spLocks noGrp="1" noRot="1" noChangeAspect="1" noMove="1" noResize="1" noEditPoints="1" noAdjustHandles="1" noChangeArrowheads="1" noChangeShapeType="1" noTextEdit="1"/>
+          </p:cNvSpPr>
+          <p:nvPr>
+            <p:extLst>
+              <p:ext uri="{386F3935-93C4-4BCD-93E2-E3B085C9AB24}">
+                <p16:designElem xmlns:p16="http://schemas.microsoft.com/office/powerpoint/2015/main" val="1"/>
+              </p:ext>
+            </p:extLst>
+          </p:nvPr>
+        </p:nvSpPr>
+        <p:spPr>
+          <a:xfrm>
+            <a:off x="4625926" y="0"/>
+            <a:ext cx="7566074" cy="6858000"/>
+          </a:xfrm>
+          <a:prstGeom prst="rect">
+            <a:avLst/>
+          </a:prstGeom>
+          <a:solidFill>
+            <a:srgbClr val="C8CACA"/>
+          </a:solidFill>
+          <a:ln>
+            <a:noFill/>
+          </a:ln>
+        </p:spPr>
+        <p:style>
+          <a:lnRef idx="2">
+            <a:schemeClr val="accent1">
+              <a:shade val="50000"/>
+            </a:schemeClr>
+          </a:lnRef>
+          <a:fillRef idx="1">
+            <a:schemeClr val="accent1"/>
+          </a:fillRef>
+          <a:effectRef idx="0">
+            <a:schemeClr val="accent1"/>
+          </a:effectRef>
+          <a:fontRef idx="minor">
+            <a:schemeClr val="lt1"/>
+          </a:fontRef>
+        </p:style>
+        <p:txBody>
+          <a:bodyPr rtlCol="0" anchor="ctr"/>
+          <a:lstStyle/>
+          <a:p>
+            <a:pPr algn="ctr"/>
+            <a:endParaRPr lang="en-US"/>
+          </a:p>
+        </p:txBody>
+      </p:sp>
+      <p:sp>
+        <p:nvSpPr>
+          <p:cNvPr id="11" name="Rounded Rectangle 28">
+            <a:extLst>
+              <a:ext uri="{FF2B5EF4-FFF2-40B4-BE49-F238E27FC236}">
+                <a16:creationId xmlns:a16="http://schemas.microsoft.com/office/drawing/2014/main" id="{AD7356EA-285B-4E5D-8FEC-104659A4FD2C}"/>
+              </a:ext>
+              <a:ext uri="{C183D7F6-B498-43B3-948B-1728B52AA6E4}">
+                <adec:decorative xmlns:adec="http://schemas.microsoft.com/office/drawing/2017/decorative" val="1"/>
+              </a:ext>
+            </a:extLst>
+          </p:cNvPr>
+          <p:cNvSpPr>
+            <a:spLocks noGrp="1" noRot="1" noChangeAspect="1" noMove="1" noResize="1" noEditPoints="1" noAdjustHandles="1" noChangeArrowheads="1" noChangeShapeType="1" noTextEdit="1"/>
+          </p:cNvSpPr>
+          <p:nvPr>
+            <p:extLst>
+              <p:ext uri="{386F3935-93C4-4BCD-93E2-E3B085C9AB24}">
+                <p16:designElem xmlns:p16="http://schemas.microsoft.com/office/powerpoint/2015/main" val="1"/>
+              </p:ext>
+            </p:extLst>
+          </p:nvPr>
+        </p:nvSpPr>
+        <p:spPr>
+          <a:xfrm>
+            <a:off x="5275903" y="640091"/>
+            <a:ext cx="6266120" cy="5577818"/>
+          </a:xfrm>
+          <a:prstGeom prst="roundRect">
+            <a:avLst>
+              <a:gd name="adj" fmla="val 0"/>
+            </a:avLst>
+          </a:prstGeom>
+          <a:solidFill>
+            <a:srgbClr val="FFFFFF"/>
+          </a:solidFill>
+          <a:ln w="9525">
+            <a:solidFill>
+              <a:srgbClr val="C8CACA"/>
+            </a:solidFill>
+          </a:ln>
+          <a:effectLst>
+            <a:outerShdw blurRad="57150" dist="19050" dir="5400000" algn="t" rotWithShape="0">
+              <a:prstClr val="black">
+                <a:alpha val="63000"/>
+              </a:prstClr>
+            </a:outerShdw>
+          </a:effectLst>
+        </p:spPr>
+        <p:style>
+          <a:lnRef idx="2">
+            <a:schemeClr val="accent1">
+              <a:shade val="50000"/>
+            </a:schemeClr>
+          </a:lnRef>
+          <a:fillRef idx="1">
+            <a:schemeClr val="accent1"/>
+          </a:fillRef>
+          <a:effectRef idx="0">
+            <a:schemeClr val="accent1"/>
+          </a:effectRef>
+          <a:fontRef idx="minor">
+            <a:schemeClr val="lt1"/>
+          </a:fontRef>
+        </p:style>
+        <p:txBody>
+          <a:bodyPr rtlCol="0" anchor="ctr"/>
+          <a:lstStyle/>
+          <a:p>
+            <a:pPr algn="ctr"/>
+            <a:endParaRPr lang="en-US"/>
+          </a:p>
+        </p:txBody>
+      </p:sp>
+      <p:pic>
+        <p:nvPicPr>
+          <p:cNvPr id="4" name="Inhaltsplatzhalter 3">
+            <a:extLst>
+              <a:ext uri="{FF2B5EF4-FFF2-40B4-BE49-F238E27FC236}">
+                <a16:creationId xmlns:a16="http://schemas.microsoft.com/office/drawing/2014/main" id="{2089BA4F-1374-4D98-BE66-C68508EA0894}"/>
+              </a:ext>
+            </a:extLst>
+          </p:cNvPr>
+          <p:cNvPicPr>
+            <a:picLocks noGrp="1" noChangeAspect="1"/>
+          </p:cNvPicPr>
+          <p:nvPr>
+            <p:ph idx="1"/>
+          </p:nvPr>
+        </p:nvPicPr>
+        <p:blipFill rotWithShape="1">
+          <a:blip r:embed="rId2"/>
+          <a:srcRect l="13367" r="8900"/>
+          <a:stretch/>
+        </p:blipFill>
+        <p:spPr>
+          <a:xfrm>
+            <a:off x="5441735" y="804672"/>
+            <a:ext cx="5934456" cy="5248656"/>
+          </a:xfrm>
+          <a:prstGeom prst="rect">
+            <a:avLst/>
+          </a:prstGeom>
+          <a:effectLst/>
+        </p:spPr>
+      </p:pic>
+      <p:sp>
+        <p:nvSpPr>
+          <p:cNvPr id="7" name="Inhaltsplatzhalter 2">
+            <a:extLst>
+              <a:ext uri="{FF2B5EF4-FFF2-40B4-BE49-F238E27FC236}">
+                <a16:creationId xmlns:a16="http://schemas.microsoft.com/office/drawing/2014/main" id="{1889E7B1-15DA-497C-AB2C-61357DC70AA3}"/>
+              </a:ext>
+            </a:extLst>
+          </p:cNvPr>
+          <p:cNvSpPr txBox="1">
+            <a:spLocks/>
+          </p:cNvSpPr>
+          <p:nvPr/>
+        </p:nvSpPr>
+        <p:spPr>
+          <a:xfrm>
+            <a:off x="417910" y="1785938"/>
+            <a:ext cx="3883027" cy="4431971"/>
+          </a:xfrm>
+          <a:prstGeom prst="rect">
+            <a:avLst/>
+          </a:prstGeom>
+        </p:spPr>
+        <p:txBody>
+          <a:bodyPr vert="horz" lIns="91440" tIns="45720" rIns="91440" bIns="45720" rtlCol="0">
+            <a:normAutofit/>
+          </a:bodyPr>
+          <a:lstStyle>
+            <a:lvl1pPr marL="228600" indent="-228600" algn="l" defTabSz="914400" rtl="0" eaLnBrk="1" latinLnBrk="0" hangingPunct="1">
+              <a:lnSpc>
+                <a:spcPct val="90000"/>
+              </a:lnSpc>
+              <a:spcBef>
+                <a:spcPts val="1000"/>
+              </a:spcBef>
+              <a:buFont typeface="Arial" panose="020B0604020202020204" pitchFamily="34" charset="0"/>
+              <a:buChar char="•"/>
+              <a:defRPr sz="2800" kern="1200">
+                <a:solidFill>
+                  <a:schemeClr val="tx1"/>
+                </a:solidFill>
+                <a:latin typeface="+mn-lt"/>
+                <a:ea typeface="+mn-ea"/>
+                <a:cs typeface="+mn-cs"/>
+              </a:defRPr>
+            </a:lvl1pPr>
+            <a:lvl2pPr marL="685800" indent="-228600" algn="l" defTabSz="914400" rtl="0" eaLnBrk="1" latinLnBrk="0" hangingPunct="1">
+              <a:lnSpc>
+                <a:spcPct val="90000"/>
+              </a:lnSpc>
+              <a:spcBef>
+                <a:spcPts val="500"/>
+              </a:spcBef>
+              <a:buFont typeface="Arial" panose="020B0604020202020204" pitchFamily="34" charset="0"/>
+              <a:buChar char="•"/>
+              <a:defRPr sz="2400" kern="1200">
+                <a:solidFill>
+                  <a:schemeClr val="tx1"/>
+                </a:solidFill>
+                <a:latin typeface="+mn-lt"/>
+                <a:ea typeface="+mn-ea"/>
+                <a:cs typeface="+mn-cs"/>
+              </a:defRPr>
+            </a:lvl2pPr>
+            <a:lvl3pPr marL="1143000" indent="-228600" algn="l" defTabSz="914400" rtl="0" eaLnBrk="1" latinLnBrk="0" hangingPunct="1">
+              <a:lnSpc>
+                <a:spcPct val="90000"/>
+              </a:lnSpc>
+              <a:spcBef>
+                <a:spcPts val="500"/>
+              </a:spcBef>
+              <a:buFont typeface="Arial" panose="020B0604020202020204" pitchFamily="34" charset="0"/>
+              <a:buChar char="•"/>
+              <a:defRPr sz="2000" kern="1200">
+                <a:solidFill>
+                  <a:schemeClr val="tx1"/>
+                </a:solidFill>
+                <a:latin typeface="+mn-lt"/>
+                <a:ea typeface="+mn-ea"/>
+                <a:cs typeface="+mn-cs"/>
+              </a:defRPr>
+            </a:lvl3pPr>
+            <a:lvl4pPr marL="1600200" indent="-228600" algn="l" defTabSz="914400" rtl="0" eaLnBrk="1" latinLnBrk="0" hangingPunct="1">
+              <a:lnSpc>
+                <a:spcPct val="90000"/>
+              </a:lnSpc>
+              <a:spcBef>
+                <a:spcPts val="500"/>
+              </a:spcBef>
+              <a:buFont typeface="Arial" panose="020B0604020202020204" pitchFamily="34" charset="0"/>
+              <a:buChar char="•"/>
+              <a:defRPr sz="1800" kern="1200">
+                <a:solidFill>
+                  <a:schemeClr val="tx1"/>
+                </a:solidFill>
+                <a:latin typeface="+mn-lt"/>
+                <a:ea typeface="+mn-ea"/>
+                <a:cs typeface="+mn-cs"/>
+              </a:defRPr>
+            </a:lvl4pPr>
+            <a:lvl5pPr marL="2057400" indent="-228600" algn="l" defTabSz="914400" rtl="0" eaLnBrk="1" latinLnBrk="0" hangingPunct="1">
+              <a:lnSpc>
+                <a:spcPct val="90000"/>
+              </a:lnSpc>
+              <a:spcBef>
+                <a:spcPts val="500"/>
+              </a:spcBef>
+              <a:buFont typeface="Arial" panose="020B0604020202020204" pitchFamily="34" charset="0"/>
+              <a:buChar char="•"/>
+              <a:defRPr sz="1800" kern="1200">
+                <a:solidFill>
+                  <a:schemeClr val="tx1"/>
+                </a:solidFill>
+                <a:latin typeface="+mn-lt"/>
+                <a:ea typeface="+mn-ea"/>
+                <a:cs typeface="+mn-cs"/>
+              </a:defRPr>
+            </a:lvl5pPr>
+            <a:lvl6pPr marL="2514600" indent="-228600" algn="l" defTabSz="914400" rtl="0" eaLnBrk="1" latinLnBrk="0" hangingPunct="1">
+              <a:lnSpc>
+                <a:spcPct val="90000"/>
+              </a:lnSpc>
+              <a:spcBef>
+                <a:spcPts val="500"/>
+              </a:spcBef>
+              <a:buFont typeface="Arial" panose="020B0604020202020204" pitchFamily="34" charset="0"/>
+              <a:buChar char="•"/>
+              <a:defRPr sz="1800" kern="1200">
+                <a:solidFill>
+                  <a:schemeClr val="tx1"/>
+                </a:solidFill>
+                <a:latin typeface="+mn-lt"/>
+                <a:ea typeface="+mn-ea"/>
+                <a:cs typeface="+mn-cs"/>
+              </a:defRPr>
+            </a:lvl6pPr>
+            <a:lvl7pPr marL="2971800" indent="-228600" algn="l" defTabSz="914400" rtl="0" eaLnBrk="1" latinLnBrk="0" hangingPunct="1">
+              <a:lnSpc>
+                <a:spcPct val="90000"/>
+              </a:lnSpc>
+              <a:spcBef>
+                <a:spcPts val="500"/>
+              </a:spcBef>
+              <a:buFont typeface="Arial" panose="020B0604020202020204" pitchFamily="34" charset="0"/>
+              <a:buChar char="•"/>
+              <a:defRPr sz="1800" kern="1200">
+                <a:solidFill>
+                  <a:schemeClr val="tx1"/>
+                </a:solidFill>
+                <a:latin typeface="+mn-lt"/>
+                <a:ea typeface="+mn-ea"/>
+                <a:cs typeface="+mn-cs"/>
+              </a:defRPr>
+            </a:lvl7pPr>
+            <a:lvl8pPr marL="3429000" indent="-228600" algn="l" defTabSz="914400" rtl="0" eaLnBrk="1" latinLnBrk="0" hangingPunct="1">
+              <a:lnSpc>
+                <a:spcPct val="90000"/>
+              </a:lnSpc>
+              <a:spcBef>
+                <a:spcPts val="500"/>
+              </a:spcBef>
+              <a:buFont typeface="Arial" panose="020B0604020202020204" pitchFamily="34" charset="0"/>
+              <a:buChar char="•"/>
+              <a:defRPr sz="1800" kern="1200">
+                <a:solidFill>
+                  <a:schemeClr val="tx1"/>
+                </a:solidFill>
+                <a:latin typeface="+mn-lt"/>
+                <a:ea typeface="+mn-ea"/>
+                <a:cs typeface="+mn-cs"/>
+              </a:defRPr>
+            </a:lvl8pPr>
+            <a:lvl9pPr marL="3886200" indent="-228600" algn="l" defTabSz="914400" rtl="0" eaLnBrk="1" latinLnBrk="0" hangingPunct="1">
+              <a:lnSpc>
+                <a:spcPct val="90000"/>
+              </a:lnSpc>
+              <a:spcBef>
+                <a:spcPts val="500"/>
+              </a:spcBef>
+              <a:buFont typeface="Arial" panose="020B0604020202020204" pitchFamily="34" charset="0"/>
+              <a:buChar char="•"/>
+              <a:defRPr sz="1800" kern="1200">
+                <a:solidFill>
+                  <a:schemeClr val="tx1"/>
+                </a:solidFill>
+                <a:latin typeface="+mn-lt"/>
+                <a:ea typeface="+mn-ea"/>
+                <a:cs typeface="+mn-cs"/>
+              </a:defRPr>
+            </a:lvl9pPr>
+          </a:lstStyle>
+          <a:p>
+            <a:r>
+              <a:rPr lang="en-US" sz="2000" dirty="0" err="1"/>
+              <a:t>Straße</a:t>
+            </a:r>
+            <a:r>
+              <a:rPr lang="en-US" sz="2000" dirty="0"/>
+              <a:t> </a:t>
+            </a:r>
+            <a:r>
+              <a:rPr lang="en-US" sz="2000" dirty="0" err="1"/>
+              <a:t>beinhaltet</a:t>
+            </a:r>
+            <a:r>
+              <a:rPr lang="en-US" sz="2000" dirty="0"/>
+              <a:t>:</a:t>
+            </a:r>
+          </a:p>
+          <a:p>
+            <a:pPr lvl="1"/>
+            <a:r>
+              <a:rPr lang="en-US" sz="2000" dirty="0"/>
+              <a:t>Eine Queue</a:t>
+            </a:r>
+          </a:p>
+          <a:p>
+            <a:pPr lvl="1"/>
+            <a:r>
+              <a:rPr lang="en-US" sz="2000" dirty="0" err="1"/>
+              <a:t>Straßenlänge</a:t>
+            </a:r>
+            <a:endParaRPr lang="en-US" sz="2000" dirty="0"/>
+          </a:p>
+          <a:p>
+            <a:pPr lvl="1"/>
+            <a:r>
+              <a:rPr lang="en-US" sz="2000" dirty="0"/>
+              <a:t>Dauer, die </a:t>
+            </a:r>
+            <a:r>
+              <a:rPr lang="en-US" sz="2000" dirty="0" err="1"/>
+              <a:t>Straße</a:t>
+            </a:r>
+            <a:r>
+              <a:rPr lang="en-US" sz="2000" dirty="0"/>
+              <a:t> </a:t>
+            </a:r>
+            <a:r>
+              <a:rPr lang="en-US" sz="2000" dirty="0" err="1"/>
+              <a:t>zu</a:t>
+            </a:r>
+            <a:r>
+              <a:rPr lang="en-US" sz="2000" dirty="0"/>
+              <a:t> </a:t>
+            </a:r>
+            <a:r>
+              <a:rPr lang="en-US" sz="2000" dirty="0" err="1"/>
+              <a:t>überqueren</a:t>
+            </a:r>
+            <a:endParaRPr lang="en-US" sz="2000" dirty="0"/>
+          </a:p>
+          <a:p>
+            <a:pPr lvl="1"/>
+            <a:r>
+              <a:rPr lang="en-US" sz="2000" dirty="0"/>
+              <a:t>Counter </a:t>
+            </a:r>
+            <a:r>
+              <a:rPr lang="en-US" sz="2000" dirty="0" err="1"/>
+              <a:t>zur</a:t>
+            </a:r>
+            <a:r>
+              <a:rPr lang="en-US" sz="2000" dirty="0"/>
+              <a:t> </a:t>
+            </a:r>
+            <a:r>
+              <a:rPr lang="en-US" sz="2000" dirty="0" err="1"/>
+              <a:t>Analyse</a:t>
+            </a:r>
+            <a:endParaRPr lang="en-US" sz="2000" dirty="0"/>
+          </a:p>
+          <a:p>
+            <a:r>
+              <a:rPr lang="en-US" sz="2000" dirty="0" err="1"/>
+              <a:t>Alle</a:t>
+            </a:r>
+            <a:r>
+              <a:rPr lang="en-US" sz="2000" dirty="0"/>
+              <a:t> Parameter von </a:t>
+            </a:r>
+            <a:r>
+              <a:rPr lang="en-US" sz="2000" dirty="0" err="1"/>
+              <a:t>außen</a:t>
+            </a:r>
+            <a:r>
+              <a:rPr lang="en-US" sz="2000" dirty="0"/>
+              <a:t> </a:t>
+            </a:r>
+            <a:r>
+              <a:rPr lang="en-US" sz="2000" dirty="0" err="1"/>
+              <a:t>setzbar</a:t>
+            </a:r>
+            <a:endParaRPr lang="en-US" sz="2000" dirty="0"/>
+          </a:p>
+        </p:txBody>
+      </p:sp>
+    </p:spTree>
+    <p:extLst>
+      <p:ext uri="{BB962C8B-B14F-4D97-AF65-F5344CB8AC3E}">
+        <p14:creationId xmlns:p14="http://schemas.microsoft.com/office/powerpoint/2010/main" val="1049452539"/>
+      </p:ext>
+    </p:extLst>
+  </p:cSld>
+  <p:clrMapOvr>
+    <a:masterClrMapping/>
   </p:clrMapOvr>
 </p:sld>
 </file>
@@ -3756,7 +4989,7 @@
           <a:lstStyle/>
           <a:p>
             <a:r>
-              <a:rPr lang="de-DE">
+              <a:rPr lang="de-DE" dirty="0">
                 <a:solidFill>
                   <a:srgbClr val="000000"/>
                 </a:solidFill>
@@ -3795,72 +5028,83 @@
           <a:lstStyle/>
           <a:p>
             <a:r>
-              <a:rPr lang="de-DE" sz="2000">
+              <a:rPr lang="de-DE" sz="2000" dirty="0">
                 <a:solidFill>
                   <a:srgbClr val="000000"/>
                 </a:solidFill>
               </a:rPr>
-              <a:t>Ptolemy Modell zu kreieren</a:t>
-            </a:r>
-          </a:p>
-          <a:p>
-            <a:pPr lvl="1"/>
-            <a:r>
-              <a:rPr lang="de-DE" sz="2000">
+              <a:t>Ptolemy Traffic Model mit verschiedenen Kreuzungen (T- und Cross-</a:t>
+            </a:r>
+            <a:r>
+              <a:rPr lang="de-DE" sz="2000" dirty="0" err="1">
                 <a:solidFill>
                   <a:srgbClr val="000000"/>
                 </a:solidFill>
               </a:rPr>
-              <a:t>verschiedenen Kreuzungen</a:t>
-            </a:r>
-          </a:p>
-          <a:p>
-            <a:pPr lvl="2"/>
-            <a:r>
-              <a:rPr lang="de-DE">
+              <a:t>Intersection</a:t>
+            </a:r>
+            <a:r>
+              <a:rPr lang="de-DE" sz="2000" dirty="0">
                 <a:solidFill>
                   <a:srgbClr val="000000"/>
                 </a:solidFill>
               </a:rPr>
-              <a:t>Rechtsregel</a:t>
-            </a:r>
-          </a:p>
-          <a:p>
-            <a:pPr lvl="1"/>
-            <a:r>
-              <a:rPr lang="de-DE" sz="2000">
+              <a:t>)</a:t>
+            </a:r>
+          </a:p>
+          <a:p>
+            <a:r>
+              <a:rPr lang="de-DE" sz="2000" dirty="0">
                 <a:solidFill>
                   <a:srgbClr val="000000"/>
                 </a:solidFill>
               </a:rPr>
-              <a:t>Straßen</a:t>
-            </a:r>
-          </a:p>
-          <a:p>
-            <a:pPr lvl="2"/>
-            <a:r>
-              <a:rPr lang="de-DE">
+              <a:t>Rechtsregel implementieren</a:t>
+            </a:r>
+          </a:p>
+          <a:p>
+            <a:r>
+              <a:rPr lang="de-DE" sz="2000" dirty="0">
                 <a:solidFill>
                   <a:srgbClr val="000000"/>
                 </a:solidFill>
               </a:rPr>
-              <a:t>Handhabung der Autos</a:t>
-            </a:r>
-          </a:p>
-          <a:p>
-            <a:pPr lvl="1"/>
-            <a:r>
-              <a:rPr lang="de-DE" sz="2000">
+              <a:t>Straßen mit Handhabung der Autos</a:t>
+            </a:r>
+          </a:p>
+          <a:p>
+            <a:r>
+              <a:rPr lang="de-DE" sz="2000" dirty="0">
                 <a:solidFill>
                   <a:srgbClr val="000000"/>
                 </a:solidFill>
               </a:rPr>
-              <a:t>Autos</a:t>
+              <a:t>Autos aus mehreren Komponenten</a:t>
+            </a:r>
+          </a:p>
+          <a:p>
+            <a:r>
+              <a:rPr lang="de-DE" sz="2000" dirty="0">
+                <a:solidFill>
+                  <a:srgbClr val="000000"/>
+                </a:solidFill>
+              </a:rPr>
+              <a:t>Analyse um starken Verkehr zu erkennen</a:t>
+            </a:r>
+          </a:p>
+          <a:p>
+            <a:r>
+              <a:rPr lang="de-DE" sz="2000" dirty="0">
+                <a:solidFill>
+                  <a:srgbClr val="000000"/>
+                </a:solidFill>
+              </a:rPr>
+              <a:t>Design, das es ermöglicht, einfach Verkehrsmodelle auszutauschen</a:t>
             </a:r>
           </a:p>
           <a:p>
             <a:pPr lvl="1"/>
-            <a:endParaRPr lang="de-DE" sz="2000">
+            <a:endParaRPr lang="de-DE" sz="2000" dirty="0">
               <a:solidFill>
                 <a:srgbClr val="000000"/>
               </a:solidFill>
@@ -3868,7 +5112,7 @@
           </a:p>
           <a:p>
             <a:pPr lvl="1"/>
-            <a:endParaRPr lang="de-DE" sz="2000">
+            <a:endParaRPr lang="de-DE" sz="2000" dirty="0">
               <a:solidFill>
                 <a:srgbClr val="000000"/>
               </a:solidFill>
@@ -4097,7 +5341,7 @@
         </p:blipFill>
         <p:spPr bwMode="auto">
           <a:xfrm>
-            <a:off x="6893318" y="770037"/>
+            <a:off x="6893318" y="796541"/>
             <a:ext cx="5298683" cy="6097438"/>
           </a:xfrm>
           <a:custGeom>
@@ -4169,6 +5413,2073 @@
     <p:extLst>
       <p:ext uri="{BB962C8B-B14F-4D97-AF65-F5344CB8AC3E}">
         <p14:creationId xmlns:p14="http://schemas.microsoft.com/office/powerpoint/2010/main" val="3150188416"/>
+      </p:ext>
+    </p:extLst>
+  </p:cSld>
+  <p:clrMapOvr>
+    <a:masterClrMapping/>
+  </p:clrMapOvr>
+</p:sld>
+</file>
+
+<file path=ppt/slides/slide3.xml><?xml version="1.0" encoding="utf-8"?>
+<p:sld xmlns:a="http://schemas.openxmlformats.org/drawingml/2006/main" xmlns:r="http://schemas.openxmlformats.org/officeDocument/2006/relationships" xmlns:p="http://schemas.openxmlformats.org/presentationml/2006/main">
+  <p:cSld>
+    <p:spTree>
+      <p:nvGrpSpPr>
+        <p:cNvPr id="1" name=""/>
+        <p:cNvGrpSpPr/>
+        <p:nvPr/>
+      </p:nvGrpSpPr>
+      <p:grpSpPr>
+        <a:xfrm>
+          <a:off x="0" y="0"/>
+          <a:ext cx="0" cy="0"/>
+          <a:chOff x="0" y="0"/>
+          <a:chExt cx="0" cy="0"/>
+        </a:xfrm>
+      </p:grpSpPr>
+      <p:sp>
+        <p:nvSpPr>
+          <p:cNvPr id="2" name="Titel 1">
+            <a:extLst>
+              <a:ext uri="{FF2B5EF4-FFF2-40B4-BE49-F238E27FC236}">
+                <a16:creationId xmlns:a16="http://schemas.microsoft.com/office/drawing/2014/main" id="{97BDD08A-8877-4F6B-9325-732127015AEC}"/>
+              </a:ext>
+            </a:extLst>
+          </p:cNvPr>
+          <p:cNvSpPr>
+            <a:spLocks noGrp="1"/>
+          </p:cNvSpPr>
+          <p:nvPr>
+            <p:ph type="title"/>
+          </p:nvPr>
+        </p:nvSpPr>
+        <p:spPr/>
+        <p:txBody>
+          <a:bodyPr/>
+          <a:lstStyle/>
+          <a:p>
+            <a:r>
+              <a:rPr lang="de-DE" dirty="0"/>
+              <a:t>Start-Up Phase</a:t>
+            </a:r>
+            <a:endParaRPr lang="de-IT" dirty="0"/>
+          </a:p>
+        </p:txBody>
+      </p:sp>
+      <p:sp>
+        <p:nvSpPr>
+          <p:cNvPr id="3" name="Inhaltsplatzhalter 2">
+            <a:extLst>
+              <a:ext uri="{FF2B5EF4-FFF2-40B4-BE49-F238E27FC236}">
+                <a16:creationId xmlns:a16="http://schemas.microsoft.com/office/drawing/2014/main" id="{B238CCC0-A949-424D-AB27-1EE5356FF163}"/>
+              </a:ext>
+            </a:extLst>
+          </p:cNvPr>
+          <p:cNvSpPr>
+            <a:spLocks noGrp="1"/>
+          </p:cNvSpPr>
+          <p:nvPr>
+            <p:ph idx="1"/>
+          </p:nvPr>
+        </p:nvSpPr>
+        <p:spPr/>
+        <p:txBody>
+          <a:bodyPr>
+            <a:normAutofit/>
+          </a:bodyPr>
+          <a:lstStyle/>
+          <a:p>
+            <a:r>
+              <a:rPr lang="de-DE" sz="2000" dirty="0"/>
+              <a:t>Ptolemy Demos dursuchen </a:t>
+            </a:r>
+            <a:r>
+              <a:rPr lang="de-DE" sz="2000" dirty="0">
+                <a:sym typeface="Wingdings" panose="05000000000000000000" pitchFamily="2" charset="2"/>
+              </a:rPr>
+              <a:t> „Air Traffic Model“ scheint Ähnlichkeiten aufzuweisen</a:t>
+            </a:r>
+          </a:p>
+          <a:p>
+            <a:r>
+              <a:rPr lang="de-DE" sz="2000" dirty="0">
+                <a:sym typeface="Wingdings" panose="05000000000000000000" pitchFamily="2" charset="2"/>
+              </a:rPr>
+              <a:t>Eigenen </a:t>
+            </a:r>
+            <a:r>
+              <a:rPr lang="de-DE" sz="2000" dirty="0" err="1">
+                <a:sym typeface="Wingdings" panose="05000000000000000000" pitchFamily="2" charset="2"/>
+              </a:rPr>
+              <a:t>Director</a:t>
+            </a:r>
+            <a:r>
+              <a:rPr lang="de-DE" sz="2000" dirty="0">
+                <a:sym typeface="Wingdings" panose="05000000000000000000" pitchFamily="2" charset="2"/>
+              </a:rPr>
+              <a:t> geschrieben</a:t>
+            </a:r>
+          </a:p>
+          <a:p>
+            <a:r>
+              <a:rPr lang="de-DE" sz="2000" dirty="0">
+                <a:sym typeface="Wingdings" panose="05000000000000000000" pitchFamily="2" charset="2"/>
+              </a:rPr>
+              <a:t>Eigene Models und Components geschrieben</a:t>
+            </a:r>
+          </a:p>
+          <a:p>
+            <a:r>
+              <a:rPr lang="de-DE" sz="2000" dirty="0">
+                <a:sym typeface="Wingdings" panose="05000000000000000000" pitchFamily="2" charset="2"/>
+              </a:rPr>
+              <a:t>Zu viele Fehler bei Einbindung….</a:t>
+            </a:r>
+            <a:endParaRPr lang="de-IT" sz="2000" dirty="0"/>
+          </a:p>
+        </p:txBody>
+      </p:sp>
+    </p:spTree>
+    <p:extLst>
+      <p:ext uri="{BB962C8B-B14F-4D97-AF65-F5344CB8AC3E}">
+        <p14:creationId xmlns:p14="http://schemas.microsoft.com/office/powerpoint/2010/main" val="3614932241"/>
+      </p:ext>
+    </p:extLst>
+  </p:cSld>
+  <p:clrMapOvr>
+    <a:masterClrMapping/>
+  </p:clrMapOvr>
+</p:sld>
+</file>
+
+<file path=ppt/slides/slide4.xml><?xml version="1.0" encoding="utf-8"?>
+<p:sld xmlns:a="http://schemas.openxmlformats.org/drawingml/2006/main" xmlns:r="http://schemas.openxmlformats.org/officeDocument/2006/relationships" xmlns:p="http://schemas.openxmlformats.org/presentationml/2006/main">
+  <p:cSld>
+    <p:spTree>
+      <p:nvGrpSpPr>
+        <p:cNvPr id="1" name=""/>
+        <p:cNvGrpSpPr/>
+        <p:nvPr/>
+      </p:nvGrpSpPr>
+      <p:grpSpPr>
+        <a:xfrm>
+          <a:off x="0" y="0"/>
+          <a:ext cx="0" cy="0"/>
+          <a:chOff x="0" y="0"/>
+          <a:chExt cx="0" cy="0"/>
+        </a:xfrm>
+      </p:grpSpPr>
+      <p:sp>
+        <p:nvSpPr>
+          <p:cNvPr id="2" name="Titel 1">
+            <a:extLst>
+              <a:ext uri="{FF2B5EF4-FFF2-40B4-BE49-F238E27FC236}">
+                <a16:creationId xmlns:a16="http://schemas.microsoft.com/office/drawing/2014/main" id="{BE8BA8C4-46F2-4BB2-B53C-807F9B8ACD66}"/>
+              </a:ext>
+            </a:extLst>
+          </p:cNvPr>
+          <p:cNvSpPr>
+            <a:spLocks noGrp="1"/>
+          </p:cNvSpPr>
+          <p:nvPr>
+            <p:ph type="title"/>
+          </p:nvPr>
+        </p:nvSpPr>
+        <p:spPr/>
+        <p:txBody>
+          <a:bodyPr/>
+          <a:lstStyle/>
+          <a:p>
+            <a:r>
+              <a:rPr lang="de-DE" dirty="0"/>
+              <a:t>cars.txt</a:t>
+            </a:r>
+            <a:endParaRPr lang="de-IT" dirty="0"/>
+          </a:p>
+        </p:txBody>
+      </p:sp>
+      <p:sp>
+        <p:nvSpPr>
+          <p:cNvPr id="3" name="Inhaltsplatzhalter 2">
+            <a:extLst>
+              <a:ext uri="{FF2B5EF4-FFF2-40B4-BE49-F238E27FC236}">
+                <a16:creationId xmlns:a16="http://schemas.microsoft.com/office/drawing/2014/main" id="{57C952F1-5B30-4B58-937F-295797916E15}"/>
+              </a:ext>
+            </a:extLst>
+          </p:cNvPr>
+          <p:cNvSpPr>
+            <a:spLocks noGrp="1"/>
+          </p:cNvSpPr>
+          <p:nvPr>
+            <p:ph idx="1"/>
+          </p:nvPr>
+        </p:nvSpPr>
+        <p:spPr/>
+        <p:txBody>
+          <a:bodyPr/>
+          <a:lstStyle/>
+          <a:p>
+            <a:r>
+              <a:rPr lang="de-DE" sz="2000" dirty="0"/>
+              <a:t>Ein Auto besteht, wie erwähnt aus verschiedenen Komponenten</a:t>
+            </a:r>
+          </a:p>
+          <a:p>
+            <a:r>
+              <a:rPr lang="de-DE" sz="2000" dirty="0"/>
+              <a:t>Getrennt durch ein Tab</a:t>
+            </a:r>
+          </a:p>
+          <a:p>
+            <a:endParaRPr lang="de-IT" dirty="0"/>
+          </a:p>
+        </p:txBody>
+      </p:sp>
+      <p:graphicFrame>
+        <p:nvGraphicFramePr>
+          <p:cNvPr id="4" name="Tabelle 4">
+            <a:extLst>
+              <a:ext uri="{FF2B5EF4-FFF2-40B4-BE49-F238E27FC236}">
+                <a16:creationId xmlns:a16="http://schemas.microsoft.com/office/drawing/2014/main" id="{23879C65-56E3-493F-AED5-0C6337B027BB}"/>
+              </a:ext>
+            </a:extLst>
+          </p:cNvPr>
+          <p:cNvGraphicFramePr>
+            <a:graphicFrameLocks noGrp="1"/>
+          </p:cNvGraphicFramePr>
+          <p:nvPr>
+            <p:extLst>
+              <p:ext uri="{D42A27DB-BD31-4B8C-83A1-F6EECF244321}">
+                <p14:modId xmlns:p14="http://schemas.microsoft.com/office/powerpoint/2010/main" val="1745639374"/>
+              </p:ext>
+            </p:extLst>
+          </p:nvPr>
+        </p:nvGraphicFramePr>
+        <p:xfrm>
+          <a:off x="998329" y="2793447"/>
+          <a:ext cx="9629916" cy="3050760"/>
+        </p:xfrm>
+        <a:graphic>
+          <a:graphicData uri="http://schemas.openxmlformats.org/drawingml/2006/table">
+            <a:tbl>
+              <a:tblPr firstRow="1" bandRow="1">
+                <a:tableStyleId>{F5AB1C69-6EDB-4FF4-983F-18BD219EF322}</a:tableStyleId>
+              </a:tblPr>
+              <a:tblGrid>
+                <a:gridCol w="2407479">
+                  <a:extLst>
+                    <a:ext uri="{9D8B030D-6E8A-4147-A177-3AD203B41FA5}">
+                      <a16:colId xmlns:a16="http://schemas.microsoft.com/office/drawing/2014/main" val="3947154205"/>
+                    </a:ext>
+                  </a:extLst>
+                </a:gridCol>
+                <a:gridCol w="2407479">
+                  <a:extLst>
+                    <a:ext uri="{9D8B030D-6E8A-4147-A177-3AD203B41FA5}">
+                      <a16:colId xmlns:a16="http://schemas.microsoft.com/office/drawing/2014/main" val="3402840984"/>
+                    </a:ext>
+                  </a:extLst>
+                </a:gridCol>
+                <a:gridCol w="2407479">
+                  <a:extLst>
+                    <a:ext uri="{9D8B030D-6E8A-4147-A177-3AD203B41FA5}">
+                      <a16:colId xmlns:a16="http://schemas.microsoft.com/office/drawing/2014/main" val="1410997782"/>
+                    </a:ext>
+                  </a:extLst>
+                </a:gridCol>
+                <a:gridCol w="2407479">
+                  <a:extLst>
+                    <a:ext uri="{9D8B030D-6E8A-4147-A177-3AD203B41FA5}">
+                      <a16:colId xmlns:a16="http://schemas.microsoft.com/office/drawing/2014/main" val="948437047"/>
+                    </a:ext>
+                  </a:extLst>
+                </a:gridCol>
+              </a:tblGrid>
+              <a:tr h="610152">
+                <a:tc>
+                  <a:txBody>
+                    <a:bodyPr/>
+                    <a:lstStyle/>
+                    <a:p>
+                      <a:r>
+                        <a:rPr lang="de-DE" sz="2200" dirty="0" err="1"/>
+                        <a:t>carId</a:t>
+                      </a:r>
+                      <a:endParaRPr lang="de-IT" sz="2200" dirty="0"/>
+                    </a:p>
+                  </a:txBody>
+                  <a:tcPr/>
+                </a:tc>
+                <a:tc>
+                  <a:txBody>
+                    <a:bodyPr/>
+                    <a:lstStyle/>
+                    <a:p>
+                      <a:r>
+                        <a:rPr lang="de-DE" sz="2200" dirty="0" err="1"/>
+                        <a:t>roadMap</a:t>
+                      </a:r>
+                      <a:endParaRPr lang="de-IT" sz="2200" dirty="0"/>
+                    </a:p>
+                  </a:txBody>
+                  <a:tcPr/>
+                </a:tc>
+                <a:tc>
+                  <a:txBody>
+                    <a:bodyPr/>
+                    <a:lstStyle/>
+                    <a:p>
+                      <a:r>
+                        <a:rPr lang="de-DE" sz="2200" dirty="0" err="1"/>
+                        <a:t>indicator</a:t>
+                      </a:r>
+                      <a:endParaRPr lang="de-IT" sz="2200" dirty="0"/>
+                    </a:p>
+                  </a:txBody>
+                  <a:tcPr/>
+                </a:tc>
+                <a:tc>
+                  <a:txBody>
+                    <a:bodyPr/>
+                    <a:lstStyle/>
+                    <a:p>
+                      <a:r>
+                        <a:rPr lang="de-DE" sz="2200" dirty="0" err="1"/>
+                        <a:t>intersectionCount</a:t>
+                      </a:r>
+                      <a:endParaRPr lang="de-IT" sz="2200" dirty="0"/>
+                    </a:p>
+                  </a:txBody>
+                  <a:tcPr/>
+                </a:tc>
+                <a:extLst>
+                  <a:ext uri="{0D108BD9-81ED-4DB2-BD59-A6C34878D82A}">
+                    <a16:rowId xmlns:a16="http://schemas.microsoft.com/office/drawing/2014/main" val="2563282972"/>
+                  </a:ext>
+                </a:extLst>
+              </a:tr>
+              <a:tr h="610152">
+                <a:tc>
+                  <a:txBody>
+                    <a:bodyPr/>
+                    <a:lstStyle/>
+                    <a:p>
+                      <a:r>
+                        <a:rPr lang="de-DE" sz="2200" dirty="0"/>
+                        <a:t>0</a:t>
+                      </a:r>
+                      <a:endParaRPr lang="de-IT" sz="2200" dirty="0"/>
+                    </a:p>
+                  </a:txBody>
+                  <a:tcPr/>
+                </a:tc>
+                <a:tc>
+                  <a:txBody>
+                    <a:bodyPr/>
+                    <a:lstStyle/>
+                    <a:p>
+                      <a:r>
+                        <a:rPr lang="de-DE" sz="2200" dirty="0"/>
+                        <a:t>{2, 4}</a:t>
+                      </a:r>
+                    </a:p>
+                  </a:txBody>
+                  <a:tcPr/>
+                </a:tc>
+                <a:tc>
+                  <a:txBody>
+                    <a:bodyPr/>
+                    <a:lstStyle/>
+                    <a:p>
+                      <a:r>
+                        <a:rPr lang="de-DE" sz="2200" dirty="0"/>
+                        <a:t>0</a:t>
+                      </a:r>
+                      <a:endParaRPr lang="de-IT" sz="2200" dirty="0"/>
+                    </a:p>
+                  </a:txBody>
+                  <a:tcPr/>
+                </a:tc>
+                <a:tc>
+                  <a:txBody>
+                    <a:bodyPr/>
+                    <a:lstStyle/>
+                    <a:p>
+                      <a:r>
+                        <a:rPr lang="de-DE" sz="2200" dirty="0"/>
+                        <a:t>0</a:t>
+                      </a:r>
+                      <a:endParaRPr lang="de-IT" sz="2200" dirty="0"/>
+                    </a:p>
+                  </a:txBody>
+                  <a:tcPr/>
+                </a:tc>
+                <a:extLst>
+                  <a:ext uri="{0D108BD9-81ED-4DB2-BD59-A6C34878D82A}">
+                    <a16:rowId xmlns:a16="http://schemas.microsoft.com/office/drawing/2014/main" val="14817319"/>
+                  </a:ext>
+                </a:extLst>
+              </a:tr>
+              <a:tr h="610152">
+                <a:tc>
+                  <a:txBody>
+                    <a:bodyPr/>
+                    <a:lstStyle/>
+                    <a:p>
+                      <a:r>
+                        <a:rPr lang="de-DE" sz="2200" dirty="0"/>
+                        <a:t>1</a:t>
+                      </a:r>
+                      <a:endParaRPr lang="de-IT" sz="2200" dirty="0"/>
+                    </a:p>
+                  </a:txBody>
+                  <a:tcPr/>
+                </a:tc>
+                <a:tc>
+                  <a:txBody>
+                    <a:bodyPr/>
+                    <a:lstStyle/>
+                    <a:p>
+                      <a:r>
+                        <a:rPr lang="de-DE" sz="2200" dirty="0"/>
+                        <a:t>{4, 5, 10}</a:t>
+                      </a:r>
+                      <a:endParaRPr lang="de-IT" sz="2200" dirty="0"/>
+                    </a:p>
+                  </a:txBody>
+                  <a:tcPr/>
+                </a:tc>
+                <a:tc>
+                  <a:txBody>
+                    <a:bodyPr/>
+                    <a:lstStyle/>
+                    <a:p>
+                      <a:r>
+                        <a:rPr lang="de-DE" sz="2200" dirty="0"/>
+                        <a:t>0</a:t>
+                      </a:r>
+                      <a:endParaRPr lang="de-IT" sz="2200" dirty="0"/>
+                    </a:p>
+                  </a:txBody>
+                  <a:tcPr/>
+                </a:tc>
+                <a:tc>
+                  <a:txBody>
+                    <a:bodyPr/>
+                    <a:lstStyle/>
+                    <a:p>
+                      <a:r>
+                        <a:rPr lang="de-DE" sz="2200" dirty="0"/>
+                        <a:t>0</a:t>
+                      </a:r>
+                      <a:endParaRPr lang="de-IT" sz="2200" dirty="0"/>
+                    </a:p>
+                  </a:txBody>
+                  <a:tcPr/>
+                </a:tc>
+                <a:extLst>
+                  <a:ext uri="{0D108BD9-81ED-4DB2-BD59-A6C34878D82A}">
+                    <a16:rowId xmlns:a16="http://schemas.microsoft.com/office/drawing/2014/main" val="188450345"/>
+                  </a:ext>
+                </a:extLst>
+              </a:tr>
+              <a:tr h="610152">
+                <a:tc>
+                  <a:txBody>
+                    <a:bodyPr/>
+                    <a:lstStyle/>
+                    <a:p>
+                      <a:r>
+                        <a:rPr lang="de-DE" sz="2200" dirty="0"/>
+                        <a:t>2</a:t>
+                      </a:r>
+                      <a:endParaRPr lang="de-IT" sz="2200" dirty="0"/>
+                    </a:p>
+                  </a:txBody>
+                  <a:tcPr/>
+                </a:tc>
+                <a:tc>
+                  <a:txBody>
+                    <a:bodyPr/>
+                    <a:lstStyle/>
+                    <a:p>
+                      <a:r>
+                        <a:rPr lang="de-DE" sz="2200" dirty="0"/>
+                        <a:t>{2, 6, 12}</a:t>
+                      </a:r>
+                      <a:endParaRPr lang="de-IT" sz="2200" dirty="0"/>
+                    </a:p>
+                  </a:txBody>
+                  <a:tcPr/>
+                </a:tc>
+                <a:tc>
+                  <a:txBody>
+                    <a:bodyPr/>
+                    <a:lstStyle/>
+                    <a:p>
+                      <a:r>
+                        <a:rPr lang="de-DE" sz="2200" dirty="0"/>
+                        <a:t>0</a:t>
+                      </a:r>
+                      <a:endParaRPr lang="de-IT" sz="2200" dirty="0"/>
+                    </a:p>
+                  </a:txBody>
+                  <a:tcPr/>
+                </a:tc>
+                <a:tc>
+                  <a:txBody>
+                    <a:bodyPr/>
+                    <a:lstStyle/>
+                    <a:p>
+                      <a:r>
+                        <a:rPr lang="de-DE" sz="2200" dirty="0"/>
+                        <a:t>0</a:t>
+                      </a:r>
+                      <a:endParaRPr lang="de-IT" sz="2200" dirty="0"/>
+                    </a:p>
+                  </a:txBody>
+                  <a:tcPr/>
+                </a:tc>
+                <a:extLst>
+                  <a:ext uri="{0D108BD9-81ED-4DB2-BD59-A6C34878D82A}">
+                    <a16:rowId xmlns:a16="http://schemas.microsoft.com/office/drawing/2014/main" val="1412846757"/>
+                  </a:ext>
+                </a:extLst>
+              </a:tr>
+              <a:tr h="610152">
+                <a:tc>
+                  <a:txBody>
+                    <a:bodyPr/>
+                    <a:lstStyle/>
+                    <a:p>
+                      <a:r>
+                        <a:rPr lang="de-DE" sz="2200" dirty="0"/>
+                        <a:t>3</a:t>
+                      </a:r>
+                      <a:endParaRPr lang="de-IT" sz="2200" dirty="0"/>
+                    </a:p>
+                  </a:txBody>
+                  <a:tcPr/>
+                </a:tc>
+                <a:tc>
+                  <a:txBody>
+                    <a:bodyPr/>
+                    <a:lstStyle/>
+                    <a:p>
+                      <a:r>
+                        <a:rPr lang="de-DE" sz="2200" dirty="0"/>
+                        <a:t>{2, 4, 5, 8}</a:t>
+                      </a:r>
+                      <a:endParaRPr lang="de-IT" sz="2200" dirty="0"/>
+                    </a:p>
+                  </a:txBody>
+                  <a:tcPr/>
+                </a:tc>
+                <a:tc>
+                  <a:txBody>
+                    <a:bodyPr/>
+                    <a:lstStyle/>
+                    <a:p>
+                      <a:r>
+                        <a:rPr lang="de-DE" sz="2200" dirty="0"/>
+                        <a:t>0</a:t>
+                      </a:r>
+                      <a:endParaRPr lang="de-IT" sz="2200" dirty="0"/>
+                    </a:p>
+                  </a:txBody>
+                  <a:tcPr/>
+                </a:tc>
+                <a:tc>
+                  <a:txBody>
+                    <a:bodyPr/>
+                    <a:lstStyle/>
+                    <a:p>
+                      <a:r>
+                        <a:rPr lang="de-DE" sz="2200" dirty="0"/>
+                        <a:t>0</a:t>
+                      </a:r>
+                      <a:endParaRPr lang="de-IT" sz="2200" dirty="0"/>
+                    </a:p>
+                  </a:txBody>
+                  <a:tcPr/>
+                </a:tc>
+                <a:extLst>
+                  <a:ext uri="{0D108BD9-81ED-4DB2-BD59-A6C34878D82A}">
+                    <a16:rowId xmlns:a16="http://schemas.microsoft.com/office/drawing/2014/main" val="314188130"/>
+                  </a:ext>
+                </a:extLst>
+              </a:tr>
+            </a:tbl>
+          </a:graphicData>
+        </a:graphic>
+      </p:graphicFrame>
+    </p:spTree>
+    <p:extLst>
+      <p:ext uri="{BB962C8B-B14F-4D97-AF65-F5344CB8AC3E}">
+        <p14:creationId xmlns:p14="http://schemas.microsoft.com/office/powerpoint/2010/main" val="807464444"/>
+      </p:ext>
+    </p:extLst>
+  </p:cSld>
+  <p:clrMapOvr>
+    <a:masterClrMapping/>
+  </p:clrMapOvr>
+</p:sld>
+</file>
+
+<file path=ppt/slides/slide5.xml><?xml version="1.0" encoding="utf-8"?>
+<p:sld xmlns:a="http://schemas.openxmlformats.org/drawingml/2006/main" xmlns:r="http://schemas.openxmlformats.org/officeDocument/2006/relationships" xmlns:p="http://schemas.openxmlformats.org/presentationml/2006/main">
+  <p:cSld>
+    <p:bg>
+      <p:bgPr>
+        <a:solidFill>
+          <a:schemeClr val="bg1"/>
+        </a:solidFill>
+        <a:effectLst/>
+      </p:bgPr>
+    </p:bg>
+    <p:spTree>
+      <p:nvGrpSpPr>
+        <p:cNvPr id="1" name=""/>
+        <p:cNvGrpSpPr/>
+        <p:nvPr/>
+      </p:nvGrpSpPr>
+      <p:grpSpPr>
+        <a:xfrm>
+          <a:off x="0" y="0"/>
+          <a:ext cx="0" cy="0"/>
+          <a:chOff x="0" y="0"/>
+          <a:chExt cx="0" cy="0"/>
+        </a:xfrm>
+      </p:grpSpPr>
+      <p:sp>
+        <p:nvSpPr>
+          <p:cNvPr id="2" name="Titel 1">
+            <a:extLst>
+              <a:ext uri="{FF2B5EF4-FFF2-40B4-BE49-F238E27FC236}">
+                <a16:creationId xmlns:a16="http://schemas.microsoft.com/office/drawing/2014/main" id="{C9D55DE5-F402-4DA2-BD05-E2212D5730F3}"/>
+              </a:ext>
+            </a:extLst>
+          </p:cNvPr>
+          <p:cNvSpPr>
+            <a:spLocks noGrp="1"/>
+          </p:cNvSpPr>
+          <p:nvPr>
+            <p:ph type="title"/>
+          </p:nvPr>
+        </p:nvSpPr>
+        <p:spPr>
+          <a:xfrm>
+            <a:off x="648930" y="629266"/>
+            <a:ext cx="3605572" cy="1676603"/>
+          </a:xfrm>
+        </p:spPr>
+        <p:txBody>
+          <a:bodyPr>
+            <a:normAutofit/>
+          </a:bodyPr>
+          <a:lstStyle/>
+          <a:p>
+            <a:r>
+              <a:rPr lang="de-DE" sz="3700"/>
+              <a:t>Entdeckung des JavaScript-Actors</a:t>
+            </a:r>
+            <a:endParaRPr lang="de-IT" sz="3700"/>
+          </a:p>
+        </p:txBody>
+      </p:sp>
+      <p:sp>
+        <p:nvSpPr>
+          <p:cNvPr id="3" name="Inhaltsplatzhalter 2">
+            <a:extLst>
+              <a:ext uri="{FF2B5EF4-FFF2-40B4-BE49-F238E27FC236}">
+                <a16:creationId xmlns:a16="http://schemas.microsoft.com/office/drawing/2014/main" id="{5121B6C1-53AC-42D1-B133-677D7D4EDB5A}"/>
+              </a:ext>
+            </a:extLst>
+          </p:cNvPr>
+          <p:cNvSpPr>
+            <a:spLocks noGrp="1"/>
+          </p:cNvSpPr>
+          <p:nvPr>
+            <p:ph idx="1"/>
+          </p:nvPr>
+        </p:nvSpPr>
+        <p:spPr>
+          <a:xfrm>
+            <a:off x="648931" y="2438401"/>
+            <a:ext cx="3605571" cy="3779520"/>
+          </a:xfrm>
+        </p:spPr>
+        <p:txBody>
+          <a:bodyPr>
+            <a:normAutofit/>
+          </a:bodyPr>
+          <a:lstStyle/>
+          <a:p>
+            <a:r>
+              <a:rPr lang="de-DE" sz="2000" dirty="0"/>
+              <a:t>Wir begannen mit JavaScript eigenen Code in unser Modell einzuschleusen</a:t>
+            </a:r>
+          </a:p>
+          <a:p>
+            <a:r>
+              <a:rPr lang="de-DE" sz="2000" dirty="0"/>
+              <a:t>Damit konnten wir simple </a:t>
+            </a:r>
+            <a:r>
+              <a:rPr lang="de-DE" sz="2000" dirty="0" err="1"/>
+              <a:t>if</a:t>
+            </a:r>
+            <a:r>
+              <a:rPr lang="de-DE" sz="2000" dirty="0"/>
+              <a:t>-Bedingungen erzeugen und die Input-Ports besser kontrollieren</a:t>
+            </a:r>
+            <a:endParaRPr lang="de-IT" sz="2000" dirty="0"/>
+          </a:p>
+        </p:txBody>
+      </p:sp>
+      <p:sp>
+        <p:nvSpPr>
+          <p:cNvPr id="9" name="Rectangle 8">
+            <a:extLst>
+              <a:ext uri="{FF2B5EF4-FFF2-40B4-BE49-F238E27FC236}">
+                <a16:creationId xmlns:a16="http://schemas.microsoft.com/office/drawing/2014/main" id="{577D1452-F0B7-431E-9A24-D3F7103D8510}"/>
+              </a:ext>
+              <a:ext uri="{C183D7F6-B498-43B3-948B-1728B52AA6E4}">
+                <adec:decorative xmlns:adec="http://schemas.microsoft.com/office/drawing/2017/decorative" val="1"/>
+              </a:ext>
+            </a:extLst>
+          </p:cNvPr>
+          <p:cNvSpPr>
+            <a:spLocks noGrp="1" noRot="1" noChangeAspect="1" noMove="1" noResize="1" noEditPoints="1" noAdjustHandles="1" noChangeArrowheads="1" noChangeShapeType="1" noTextEdit="1"/>
+          </p:cNvSpPr>
+          <p:nvPr>
+            <p:extLst>
+              <p:ext uri="{386F3935-93C4-4BCD-93E2-E3B085C9AB24}">
+                <p16:designElem xmlns:p16="http://schemas.microsoft.com/office/powerpoint/2015/main" val="1"/>
+              </p:ext>
+            </p:extLst>
+          </p:nvPr>
+        </p:nvSpPr>
+        <p:spPr>
+          <a:xfrm>
+            <a:off x="4639056" y="0"/>
+            <a:ext cx="7552944" cy="6858000"/>
+          </a:xfrm>
+          <a:prstGeom prst="rect">
+            <a:avLst/>
+          </a:prstGeom>
+          <a:solidFill>
+            <a:srgbClr val="C8CACA"/>
+          </a:solidFill>
+          <a:ln>
+            <a:noFill/>
+          </a:ln>
+        </p:spPr>
+        <p:style>
+          <a:lnRef idx="2">
+            <a:schemeClr val="accent1">
+              <a:shade val="50000"/>
+            </a:schemeClr>
+          </a:lnRef>
+          <a:fillRef idx="1">
+            <a:schemeClr val="accent1"/>
+          </a:fillRef>
+          <a:effectRef idx="0">
+            <a:schemeClr val="accent1"/>
+          </a:effectRef>
+          <a:fontRef idx="minor">
+            <a:schemeClr val="lt1"/>
+          </a:fontRef>
+        </p:style>
+        <p:txBody>
+          <a:bodyPr rtlCol="0" anchor="ctr"/>
+          <a:lstStyle/>
+          <a:p>
+            <a:pPr algn="ctr"/>
+            <a:endParaRPr lang="en-US"/>
+          </a:p>
+        </p:txBody>
+      </p:sp>
+      <p:sp>
+        <p:nvSpPr>
+          <p:cNvPr id="11" name="Rounded Rectangle 20">
+            <a:extLst>
+              <a:ext uri="{FF2B5EF4-FFF2-40B4-BE49-F238E27FC236}">
+                <a16:creationId xmlns:a16="http://schemas.microsoft.com/office/drawing/2014/main" id="{A660F4F9-5DF5-4F15-BE6A-CD8648BB1148}"/>
+              </a:ext>
+              <a:ext uri="{C183D7F6-B498-43B3-948B-1728B52AA6E4}">
+                <adec:decorative xmlns:adec="http://schemas.microsoft.com/office/drawing/2017/decorative" val="1"/>
+              </a:ext>
+            </a:extLst>
+          </p:cNvPr>
+          <p:cNvSpPr>
+            <a:spLocks noGrp="1" noRot="1" noChangeAspect="1" noMove="1" noResize="1" noEditPoints="1" noAdjustHandles="1" noChangeArrowheads="1" noChangeShapeType="1" noTextEdit="1"/>
+          </p:cNvSpPr>
+          <p:nvPr>
+            <p:extLst>
+              <p:ext uri="{386F3935-93C4-4BCD-93E2-E3B085C9AB24}">
+                <p16:designElem xmlns:p16="http://schemas.microsoft.com/office/powerpoint/2015/main" val="1"/>
+              </p:ext>
+            </p:extLst>
+          </p:nvPr>
+        </p:nvSpPr>
+        <p:spPr>
+          <a:xfrm>
+            <a:off x="5118267" y="559407"/>
+            <a:ext cx="6594522" cy="5739187"/>
+          </a:xfrm>
+          <a:prstGeom prst="roundRect">
+            <a:avLst>
+              <a:gd name="adj" fmla="val 0"/>
+            </a:avLst>
+          </a:prstGeom>
+          <a:solidFill>
+            <a:srgbClr val="FFFFFF"/>
+          </a:solidFill>
+          <a:ln w="9525">
+            <a:solidFill>
+              <a:srgbClr val="C8CACA"/>
+            </a:solidFill>
+          </a:ln>
+          <a:effectLst>
+            <a:outerShdw blurRad="57150" dist="19050" dir="5400000" algn="t" rotWithShape="0">
+              <a:prstClr val="black">
+                <a:alpha val="63000"/>
+              </a:prstClr>
+            </a:outerShdw>
+          </a:effectLst>
+        </p:spPr>
+        <p:style>
+          <a:lnRef idx="2">
+            <a:schemeClr val="accent1">
+              <a:shade val="50000"/>
+            </a:schemeClr>
+          </a:lnRef>
+          <a:fillRef idx="1">
+            <a:schemeClr val="accent1"/>
+          </a:fillRef>
+          <a:effectRef idx="0">
+            <a:schemeClr val="accent1"/>
+          </a:effectRef>
+          <a:fontRef idx="minor">
+            <a:schemeClr val="lt1"/>
+          </a:fontRef>
+        </p:style>
+        <p:txBody>
+          <a:bodyPr rtlCol="0" anchor="ctr"/>
+          <a:lstStyle/>
+          <a:p>
+            <a:pPr algn="ctr"/>
+            <a:endParaRPr lang="en-US"/>
+          </a:p>
+        </p:txBody>
+      </p:sp>
+      <p:pic>
+        <p:nvPicPr>
+          <p:cNvPr id="4" name="Grafik 3">
+            <a:extLst>
+              <a:ext uri="{FF2B5EF4-FFF2-40B4-BE49-F238E27FC236}">
+                <a16:creationId xmlns:a16="http://schemas.microsoft.com/office/drawing/2014/main" id="{790E115A-A6C6-4630-9C5F-68782076014D}"/>
+              </a:ext>
+            </a:extLst>
+          </p:cNvPr>
+          <p:cNvPicPr>
+            <a:picLocks noChangeAspect="1"/>
+          </p:cNvPicPr>
+          <p:nvPr/>
+        </p:nvPicPr>
+        <p:blipFill rotWithShape="1">
+          <a:blip r:embed="rId2"/>
+          <a:srcRect t="1512" r="-1" b="-1"/>
+          <a:stretch/>
+        </p:blipFill>
+        <p:spPr>
+          <a:xfrm>
+            <a:off x="5283708" y="722376"/>
+            <a:ext cx="6263640" cy="5413248"/>
+          </a:xfrm>
+          <a:prstGeom prst="rect">
+            <a:avLst/>
+          </a:prstGeom>
+          <a:effectLst/>
+        </p:spPr>
+      </p:pic>
+    </p:spTree>
+    <p:extLst>
+      <p:ext uri="{BB962C8B-B14F-4D97-AF65-F5344CB8AC3E}">
+        <p14:creationId xmlns:p14="http://schemas.microsoft.com/office/powerpoint/2010/main" val="2044130324"/>
+      </p:ext>
+    </p:extLst>
+  </p:cSld>
+  <p:clrMapOvr>
+    <a:masterClrMapping/>
+  </p:clrMapOvr>
+</p:sld>
+</file>
+
+<file path=ppt/slides/slide6.xml><?xml version="1.0" encoding="utf-8"?>
+<p:sld xmlns:a="http://schemas.openxmlformats.org/drawingml/2006/main" xmlns:r="http://schemas.openxmlformats.org/officeDocument/2006/relationships" xmlns:p="http://schemas.openxmlformats.org/presentationml/2006/main">
+  <p:cSld>
+    <p:bg>
+      <p:bgPr>
+        <a:solidFill>
+          <a:schemeClr val="bg1"/>
+        </a:solidFill>
+        <a:effectLst/>
+      </p:bgPr>
+    </p:bg>
+    <p:spTree>
+      <p:nvGrpSpPr>
+        <p:cNvPr id="1" name=""/>
+        <p:cNvGrpSpPr/>
+        <p:nvPr/>
+      </p:nvGrpSpPr>
+      <p:grpSpPr>
+        <a:xfrm>
+          <a:off x="0" y="0"/>
+          <a:ext cx="0" cy="0"/>
+          <a:chOff x="0" y="0"/>
+          <a:chExt cx="0" cy="0"/>
+        </a:xfrm>
+      </p:grpSpPr>
+      <p:sp>
+        <p:nvSpPr>
+          <p:cNvPr id="2" name="Titel 1">
+            <a:extLst>
+              <a:ext uri="{FF2B5EF4-FFF2-40B4-BE49-F238E27FC236}">
+                <a16:creationId xmlns:a16="http://schemas.microsoft.com/office/drawing/2014/main" id="{CC14FF9A-577A-4E6C-8CBD-2703C9EDD042}"/>
+              </a:ext>
+            </a:extLst>
+          </p:cNvPr>
+          <p:cNvSpPr>
+            <a:spLocks noGrp="1"/>
+          </p:cNvSpPr>
+          <p:nvPr>
+            <p:ph type="title"/>
+          </p:nvPr>
+        </p:nvSpPr>
+        <p:spPr>
+          <a:xfrm>
+            <a:off x="645859" y="640081"/>
+            <a:ext cx="3494341" cy="3793488"/>
+          </a:xfrm>
+          <a:noFill/>
+        </p:spPr>
+        <p:txBody>
+          <a:bodyPr vert="horz" lIns="91440" tIns="45720" rIns="91440" bIns="45720" rtlCol="0" anchor="b">
+            <a:normAutofit/>
+          </a:bodyPr>
+          <a:lstStyle/>
+          <a:p>
+            <a:r>
+              <a:rPr lang="en-US" sz="4600"/>
+              <a:t>T-Intersection besteht aus…</a:t>
+            </a:r>
+          </a:p>
+        </p:txBody>
+      </p:sp>
+      <p:sp>
+        <p:nvSpPr>
+          <p:cNvPr id="9" name="Rectangle 8">
+            <a:extLst>
+              <a:ext uri="{FF2B5EF4-FFF2-40B4-BE49-F238E27FC236}">
+                <a16:creationId xmlns:a16="http://schemas.microsoft.com/office/drawing/2014/main" id="{71FC7D98-7B8B-402A-90FC-F027482F2142}"/>
+              </a:ext>
+              <a:ext uri="{C183D7F6-B498-43B3-948B-1728B52AA6E4}">
+                <adec:decorative xmlns:adec="http://schemas.microsoft.com/office/drawing/2017/decorative" val="1"/>
+              </a:ext>
+            </a:extLst>
+          </p:cNvPr>
+          <p:cNvSpPr>
+            <a:spLocks noGrp="1" noRot="1" noChangeAspect="1" noMove="1" noResize="1" noEditPoints="1" noAdjustHandles="1" noChangeArrowheads="1" noChangeShapeType="1" noTextEdit="1"/>
+          </p:cNvSpPr>
+          <p:nvPr>
+            <p:extLst>
+              <p:ext uri="{386F3935-93C4-4BCD-93E2-E3B085C9AB24}">
+                <p16:designElem xmlns:p16="http://schemas.microsoft.com/office/powerpoint/2015/main" val="1"/>
+              </p:ext>
+            </p:extLst>
+          </p:nvPr>
+        </p:nvSpPr>
+        <p:spPr>
+          <a:xfrm>
+            <a:off x="4625926" y="0"/>
+            <a:ext cx="7566074" cy="6858000"/>
+          </a:xfrm>
+          <a:prstGeom prst="rect">
+            <a:avLst/>
+          </a:prstGeom>
+          <a:solidFill>
+            <a:srgbClr val="C8CACA"/>
+          </a:solidFill>
+          <a:ln>
+            <a:noFill/>
+          </a:ln>
+        </p:spPr>
+        <p:style>
+          <a:lnRef idx="2">
+            <a:schemeClr val="accent1">
+              <a:shade val="50000"/>
+            </a:schemeClr>
+          </a:lnRef>
+          <a:fillRef idx="1">
+            <a:schemeClr val="accent1"/>
+          </a:fillRef>
+          <a:effectRef idx="0">
+            <a:schemeClr val="accent1"/>
+          </a:effectRef>
+          <a:fontRef idx="minor">
+            <a:schemeClr val="lt1"/>
+          </a:fontRef>
+        </p:style>
+        <p:txBody>
+          <a:bodyPr rtlCol="0" anchor="ctr"/>
+          <a:lstStyle/>
+          <a:p>
+            <a:pPr algn="ctr"/>
+            <a:endParaRPr lang="en-US"/>
+          </a:p>
+        </p:txBody>
+      </p:sp>
+      <p:sp>
+        <p:nvSpPr>
+          <p:cNvPr id="11" name="Rounded Rectangle 28">
+            <a:extLst>
+              <a:ext uri="{FF2B5EF4-FFF2-40B4-BE49-F238E27FC236}">
+                <a16:creationId xmlns:a16="http://schemas.microsoft.com/office/drawing/2014/main" id="{AD7356EA-285B-4E5D-8FEC-104659A4FD2C}"/>
+              </a:ext>
+              <a:ext uri="{C183D7F6-B498-43B3-948B-1728B52AA6E4}">
+                <adec:decorative xmlns:adec="http://schemas.microsoft.com/office/drawing/2017/decorative" val="1"/>
+              </a:ext>
+            </a:extLst>
+          </p:cNvPr>
+          <p:cNvSpPr>
+            <a:spLocks noGrp="1" noRot="1" noChangeAspect="1" noMove="1" noResize="1" noEditPoints="1" noAdjustHandles="1" noChangeArrowheads="1" noChangeShapeType="1" noTextEdit="1"/>
+          </p:cNvSpPr>
+          <p:nvPr>
+            <p:extLst>
+              <p:ext uri="{386F3935-93C4-4BCD-93E2-E3B085C9AB24}">
+                <p16:designElem xmlns:p16="http://schemas.microsoft.com/office/powerpoint/2015/main" val="1"/>
+              </p:ext>
+            </p:extLst>
+          </p:nvPr>
+        </p:nvSpPr>
+        <p:spPr>
+          <a:xfrm>
+            <a:off x="5275903" y="640091"/>
+            <a:ext cx="6266120" cy="5577818"/>
+          </a:xfrm>
+          <a:prstGeom prst="roundRect">
+            <a:avLst>
+              <a:gd name="adj" fmla="val 0"/>
+            </a:avLst>
+          </a:prstGeom>
+          <a:solidFill>
+            <a:srgbClr val="FFFFFF"/>
+          </a:solidFill>
+          <a:ln w="9525">
+            <a:solidFill>
+              <a:srgbClr val="C8CACA"/>
+            </a:solidFill>
+          </a:ln>
+          <a:effectLst>
+            <a:outerShdw blurRad="57150" dist="19050" dir="5400000" algn="t" rotWithShape="0">
+              <a:prstClr val="black">
+                <a:alpha val="63000"/>
+              </a:prstClr>
+            </a:outerShdw>
+          </a:effectLst>
+        </p:spPr>
+        <p:style>
+          <a:lnRef idx="2">
+            <a:schemeClr val="accent1">
+              <a:shade val="50000"/>
+            </a:schemeClr>
+          </a:lnRef>
+          <a:fillRef idx="1">
+            <a:schemeClr val="accent1"/>
+          </a:fillRef>
+          <a:effectRef idx="0">
+            <a:schemeClr val="accent1"/>
+          </a:effectRef>
+          <a:fontRef idx="minor">
+            <a:schemeClr val="lt1"/>
+          </a:fontRef>
+        </p:style>
+        <p:txBody>
+          <a:bodyPr rtlCol="0" anchor="ctr"/>
+          <a:lstStyle/>
+          <a:p>
+            <a:pPr algn="ctr"/>
+            <a:endParaRPr lang="en-US"/>
+          </a:p>
+        </p:txBody>
+      </p:sp>
+      <p:pic>
+        <p:nvPicPr>
+          <p:cNvPr id="4" name="Inhaltsplatzhalter 3">
+            <a:extLst>
+              <a:ext uri="{FF2B5EF4-FFF2-40B4-BE49-F238E27FC236}">
+                <a16:creationId xmlns:a16="http://schemas.microsoft.com/office/drawing/2014/main" id="{A3529F53-A7D9-43EA-90DE-D50848DB4F6F}"/>
+              </a:ext>
+            </a:extLst>
+          </p:cNvPr>
+          <p:cNvPicPr>
+            <a:picLocks noGrp="1" noChangeAspect="1"/>
+          </p:cNvPicPr>
+          <p:nvPr>
+            <p:ph idx="1"/>
+          </p:nvPr>
+        </p:nvPicPr>
+        <p:blipFill rotWithShape="1">
+          <a:blip r:embed="rId2"/>
+          <a:srcRect l="12656"/>
+          <a:stretch/>
+        </p:blipFill>
+        <p:spPr>
+          <a:xfrm>
+            <a:off x="5441735" y="804672"/>
+            <a:ext cx="5934456" cy="5248656"/>
+          </a:xfrm>
+          <a:prstGeom prst="rect">
+            <a:avLst/>
+          </a:prstGeom>
+          <a:effectLst/>
+        </p:spPr>
+      </p:pic>
+    </p:spTree>
+    <p:extLst>
+      <p:ext uri="{BB962C8B-B14F-4D97-AF65-F5344CB8AC3E}">
+        <p14:creationId xmlns:p14="http://schemas.microsoft.com/office/powerpoint/2010/main" val="762413222"/>
+      </p:ext>
+    </p:extLst>
+  </p:cSld>
+  <p:clrMapOvr>
+    <a:masterClrMapping/>
+  </p:clrMapOvr>
+</p:sld>
+</file>
+
+<file path=ppt/slides/slide7.xml><?xml version="1.0" encoding="utf-8"?>
+<p:sld xmlns:a="http://schemas.openxmlformats.org/drawingml/2006/main" xmlns:r="http://schemas.openxmlformats.org/officeDocument/2006/relationships" xmlns:p="http://schemas.openxmlformats.org/presentationml/2006/main">
+  <p:cSld>
+    <p:bg>
+      <p:bgPr>
+        <a:solidFill>
+          <a:schemeClr val="bg1"/>
+        </a:solidFill>
+        <a:effectLst/>
+      </p:bgPr>
+    </p:bg>
+    <p:spTree>
+      <p:nvGrpSpPr>
+        <p:cNvPr id="1" name=""/>
+        <p:cNvGrpSpPr/>
+        <p:nvPr/>
+      </p:nvGrpSpPr>
+      <p:grpSpPr>
+        <a:xfrm>
+          <a:off x="0" y="0"/>
+          <a:ext cx="0" cy="0"/>
+          <a:chOff x="0" y="0"/>
+          <a:chExt cx="0" cy="0"/>
+        </a:xfrm>
+      </p:grpSpPr>
+      <p:sp>
+        <p:nvSpPr>
+          <p:cNvPr id="2" name="Titel 1">
+            <a:extLst>
+              <a:ext uri="{FF2B5EF4-FFF2-40B4-BE49-F238E27FC236}">
+                <a16:creationId xmlns:a16="http://schemas.microsoft.com/office/drawing/2014/main" id="{CC24F3DF-47D1-4D72-845E-B280ECB0C4E0}"/>
+              </a:ext>
+            </a:extLst>
+          </p:cNvPr>
+          <p:cNvSpPr>
+            <a:spLocks noGrp="1"/>
+          </p:cNvSpPr>
+          <p:nvPr>
+            <p:ph type="title"/>
+          </p:nvPr>
+        </p:nvSpPr>
+        <p:spPr>
+          <a:xfrm>
+            <a:off x="648928" y="4675886"/>
+            <a:ext cx="3685032" cy="1608328"/>
+          </a:xfrm>
+        </p:spPr>
+        <p:txBody>
+          <a:bodyPr>
+            <a:normAutofit/>
+          </a:bodyPr>
+          <a:lstStyle/>
+          <a:p>
+            <a:r>
+              <a:rPr lang="de-DE" sz="3600" dirty="0" err="1"/>
+              <a:t>Indicator</a:t>
+            </a:r>
+            <a:endParaRPr lang="de-IT" sz="3600" dirty="0"/>
+          </a:p>
+        </p:txBody>
+      </p:sp>
+      <p:sp>
+        <p:nvSpPr>
+          <p:cNvPr id="10" name="Rectangle 9">
+            <a:extLst>
+              <a:ext uri="{FF2B5EF4-FFF2-40B4-BE49-F238E27FC236}">
+                <a16:creationId xmlns:a16="http://schemas.microsoft.com/office/drawing/2014/main" id="{5AAE9118-0436-4488-AC4A-C14DF6A7B6B1}"/>
+              </a:ext>
+              <a:ext uri="{C183D7F6-B498-43B3-948B-1728B52AA6E4}">
+                <adec:decorative xmlns:adec="http://schemas.microsoft.com/office/drawing/2017/decorative" val="1"/>
+              </a:ext>
+            </a:extLst>
+          </p:cNvPr>
+          <p:cNvSpPr>
+            <a:spLocks noGrp="1" noRot="1" noChangeAspect="1" noMove="1" noResize="1" noEditPoints="1" noAdjustHandles="1" noChangeArrowheads="1" noChangeShapeType="1" noTextEdit="1"/>
+          </p:cNvSpPr>
+          <p:nvPr>
+            <p:extLst>
+              <p:ext uri="{386F3935-93C4-4BCD-93E2-E3B085C9AB24}">
+                <p16:designElem xmlns:p16="http://schemas.microsoft.com/office/powerpoint/2015/main" val="1"/>
+              </p:ext>
+            </p:extLst>
+          </p:nvPr>
+        </p:nvSpPr>
+        <p:spPr>
+          <a:xfrm>
+            <a:off x="-2" y="1"/>
+            <a:ext cx="12192002" cy="4489449"/>
+          </a:xfrm>
+          <a:prstGeom prst="rect">
+            <a:avLst/>
+          </a:prstGeom>
+          <a:solidFill>
+            <a:srgbClr val="C8CACA"/>
+          </a:solidFill>
+          <a:ln>
+            <a:noFill/>
+          </a:ln>
+        </p:spPr>
+        <p:style>
+          <a:lnRef idx="2">
+            <a:schemeClr val="accent1">
+              <a:shade val="50000"/>
+            </a:schemeClr>
+          </a:lnRef>
+          <a:fillRef idx="1">
+            <a:schemeClr val="accent1"/>
+          </a:fillRef>
+          <a:effectRef idx="0">
+            <a:schemeClr val="accent1"/>
+          </a:effectRef>
+          <a:fontRef idx="minor">
+            <a:schemeClr val="lt1"/>
+          </a:fontRef>
+        </p:style>
+        <p:txBody>
+          <a:bodyPr rtlCol="0" anchor="ctr"/>
+          <a:lstStyle/>
+          <a:p>
+            <a:pPr algn="ctr"/>
+            <a:endParaRPr lang="en-US"/>
+          </a:p>
+        </p:txBody>
+      </p:sp>
+      <p:sp>
+        <p:nvSpPr>
+          <p:cNvPr id="12" name="Rounded Rectangle 28">
+            <a:extLst>
+              <a:ext uri="{FF2B5EF4-FFF2-40B4-BE49-F238E27FC236}">
+                <a16:creationId xmlns:a16="http://schemas.microsoft.com/office/drawing/2014/main" id="{07A0C51E-5464-4470-855E-CA530A59BF98}"/>
+              </a:ext>
+              <a:ext uri="{C183D7F6-B498-43B3-948B-1728B52AA6E4}">
+                <adec:decorative xmlns:adec="http://schemas.microsoft.com/office/drawing/2017/decorative" val="1"/>
+              </a:ext>
+            </a:extLst>
+          </p:cNvPr>
+          <p:cNvSpPr>
+            <a:spLocks noGrp="1" noRot="1" noChangeAspect="1" noMove="1" noResize="1" noEditPoints="1" noAdjustHandles="1" noChangeArrowheads="1" noChangeShapeType="1" noTextEdit="1"/>
+          </p:cNvSpPr>
+          <p:nvPr>
+            <p:extLst>
+              <p:ext uri="{386F3935-93C4-4BCD-93E2-E3B085C9AB24}">
+                <p16:designElem xmlns:p16="http://schemas.microsoft.com/office/powerpoint/2015/main" val="1"/>
+              </p:ext>
+            </p:extLst>
+          </p:nvPr>
+        </p:nvSpPr>
+        <p:spPr>
+          <a:xfrm>
+            <a:off x="2059557" y="640091"/>
+            <a:ext cx="8072887" cy="3550909"/>
+          </a:xfrm>
+          <a:prstGeom prst="roundRect">
+            <a:avLst>
+              <a:gd name="adj" fmla="val 0"/>
+            </a:avLst>
+          </a:prstGeom>
+          <a:solidFill>
+            <a:srgbClr val="FFFFFF"/>
+          </a:solidFill>
+          <a:ln w="9525">
+            <a:solidFill>
+              <a:srgbClr val="C8CACA"/>
+            </a:solidFill>
+          </a:ln>
+          <a:effectLst>
+            <a:outerShdw blurRad="57150" dist="19050" dir="5400000" algn="t" rotWithShape="0">
+              <a:prstClr val="black">
+                <a:alpha val="63000"/>
+              </a:prstClr>
+            </a:outerShdw>
+          </a:effectLst>
+        </p:spPr>
+        <p:style>
+          <a:lnRef idx="2">
+            <a:schemeClr val="accent1">
+              <a:shade val="50000"/>
+            </a:schemeClr>
+          </a:lnRef>
+          <a:fillRef idx="1">
+            <a:schemeClr val="accent1"/>
+          </a:fillRef>
+          <a:effectRef idx="0">
+            <a:schemeClr val="accent1"/>
+          </a:effectRef>
+          <a:fontRef idx="minor">
+            <a:schemeClr val="lt1"/>
+          </a:fontRef>
+        </p:style>
+        <p:txBody>
+          <a:bodyPr rtlCol="0" anchor="ctr"/>
+          <a:lstStyle/>
+          <a:p>
+            <a:pPr algn="ctr"/>
+            <a:endParaRPr lang="en-US" dirty="0"/>
+          </a:p>
+        </p:txBody>
+      </p:sp>
+      <p:pic>
+        <p:nvPicPr>
+          <p:cNvPr id="5" name="Grafik 4">
+            <a:extLst>
+              <a:ext uri="{FF2B5EF4-FFF2-40B4-BE49-F238E27FC236}">
+                <a16:creationId xmlns:a16="http://schemas.microsoft.com/office/drawing/2014/main" id="{765E5461-F50B-486E-8E10-8D2CD5EF2D37}"/>
+              </a:ext>
+            </a:extLst>
+          </p:cNvPr>
+          <p:cNvPicPr>
+            <a:picLocks noChangeAspect="1"/>
+          </p:cNvPicPr>
+          <p:nvPr/>
+        </p:nvPicPr>
+        <p:blipFill rotWithShape="1">
+          <a:blip r:embed="rId2"/>
+          <a:srcRect b="11435"/>
+          <a:stretch/>
+        </p:blipFill>
+        <p:spPr>
+          <a:xfrm>
+            <a:off x="2184401" y="749300"/>
+            <a:ext cx="7823199" cy="3343043"/>
+          </a:xfrm>
+          <a:prstGeom prst="rect">
+            <a:avLst/>
+          </a:prstGeom>
+        </p:spPr>
+      </p:pic>
+      <p:sp>
+        <p:nvSpPr>
+          <p:cNvPr id="3" name="Inhaltsplatzhalter 2">
+            <a:extLst>
+              <a:ext uri="{FF2B5EF4-FFF2-40B4-BE49-F238E27FC236}">
+                <a16:creationId xmlns:a16="http://schemas.microsoft.com/office/drawing/2014/main" id="{20C7C485-16EA-40B2-8D80-267207DFF259}"/>
+              </a:ext>
+            </a:extLst>
+          </p:cNvPr>
+          <p:cNvSpPr>
+            <a:spLocks noGrp="1"/>
+          </p:cNvSpPr>
+          <p:nvPr>
+            <p:ph idx="1"/>
+          </p:nvPr>
+        </p:nvSpPr>
+        <p:spPr>
+          <a:xfrm>
+            <a:off x="4864100" y="4675886"/>
+            <a:ext cx="6675627" cy="1605083"/>
+          </a:xfrm>
+        </p:spPr>
+        <p:txBody>
+          <a:bodyPr anchor="ctr">
+            <a:normAutofit/>
+          </a:bodyPr>
+          <a:lstStyle/>
+          <a:p>
+            <a:r>
+              <a:rPr lang="de-DE" sz="2000" dirty="0"/>
+              <a:t>Der </a:t>
+            </a:r>
+            <a:r>
+              <a:rPr lang="de-DE" sz="2000" dirty="0" err="1"/>
+              <a:t>Indicator</a:t>
+            </a:r>
+            <a:r>
+              <a:rPr lang="de-DE" sz="2000" dirty="0"/>
+              <a:t> ist nichts weiter als der Blinker</a:t>
+            </a:r>
+          </a:p>
+          <a:p>
+            <a:r>
+              <a:rPr lang="de-DE" sz="2000" dirty="0"/>
+              <a:t>Er wird für jedes Auto an der </a:t>
+            </a:r>
+            <a:r>
+              <a:rPr lang="de-DE" sz="2000" dirty="0" err="1"/>
+              <a:t>Intersection</a:t>
+            </a:r>
+            <a:r>
+              <a:rPr lang="de-DE" sz="2000" dirty="0"/>
+              <a:t> gesetzt, um zu zeigen, in welche Richtung es möchte</a:t>
+            </a:r>
+            <a:endParaRPr lang="de-IT" sz="2000" dirty="0"/>
+          </a:p>
+        </p:txBody>
+      </p:sp>
+    </p:spTree>
+    <p:extLst>
+      <p:ext uri="{BB962C8B-B14F-4D97-AF65-F5344CB8AC3E}">
+        <p14:creationId xmlns:p14="http://schemas.microsoft.com/office/powerpoint/2010/main" val="1093812395"/>
+      </p:ext>
+    </p:extLst>
+  </p:cSld>
+  <p:clrMapOvr>
+    <a:masterClrMapping/>
+  </p:clrMapOvr>
+</p:sld>
+</file>
+
+<file path=ppt/slides/slide8.xml><?xml version="1.0" encoding="utf-8"?>
+<p:sld xmlns:a="http://schemas.openxmlformats.org/drawingml/2006/main" xmlns:r="http://schemas.openxmlformats.org/officeDocument/2006/relationships" xmlns:p="http://schemas.openxmlformats.org/presentationml/2006/main">
+  <p:cSld>
+    <p:spTree>
+      <p:nvGrpSpPr>
+        <p:cNvPr id="1" name=""/>
+        <p:cNvGrpSpPr/>
+        <p:nvPr/>
+      </p:nvGrpSpPr>
+      <p:grpSpPr>
+        <a:xfrm>
+          <a:off x="0" y="0"/>
+          <a:ext cx="0" cy="0"/>
+          <a:chOff x="0" y="0"/>
+          <a:chExt cx="0" cy="0"/>
+        </a:xfrm>
+      </p:grpSpPr>
+      <p:pic>
+        <p:nvPicPr>
+          <p:cNvPr id="4" name="Inhaltsplatzhalter 3">
+            <a:extLst>
+              <a:ext uri="{FF2B5EF4-FFF2-40B4-BE49-F238E27FC236}">
+                <a16:creationId xmlns:a16="http://schemas.microsoft.com/office/drawing/2014/main" id="{7907AB29-830C-4D85-8677-DEFF57B8C903}"/>
+              </a:ext>
+            </a:extLst>
+          </p:cNvPr>
+          <p:cNvPicPr>
+            <a:picLocks noGrp="1" noChangeAspect="1"/>
+          </p:cNvPicPr>
+          <p:nvPr>
+            <p:ph sz="half" idx="1"/>
+          </p:nvPr>
+        </p:nvPicPr>
+        <p:blipFill rotWithShape="1">
+          <a:blip r:embed="rId2"/>
+          <a:srcRect t="6483"/>
+          <a:stretch/>
+        </p:blipFill>
+        <p:spPr>
+          <a:xfrm>
+            <a:off x="5495925" y="1253331"/>
+            <a:ext cx="6405399" cy="4351338"/>
+          </a:xfrm>
+          <a:prstGeom prst="rect">
+            <a:avLst/>
+          </a:prstGeom>
+        </p:spPr>
+      </p:pic>
+      <p:sp>
+        <p:nvSpPr>
+          <p:cNvPr id="6" name="Inhaltsplatzhalter 5">
+            <a:extLst>
+              <a:ext uri="{FF2B5EF4-FFF2-40B4-BE49-F238E27FC236}">
+                <a16:creationId xmlns:a16="http://schemas.microsoft.com/office/drawing/2014/main" id="{91E1AFB9-12BE-4593-A855-D47739A1D92C}"/>
+              </a:ext>
+            </a:extLst>
+          </p:cNvPr>
+          <p:cNvSpPr>
+            <a:spLocks noGrp="1"/>
+          </p:cNvSpPr>
+          <p:nvPr>
+            <p:ph sz="half" idx="2"/>
+          </p:nvPr>
+        </p:nvSpPr>
+        <p:spPr>
+          <a:xfrm>
+            <a:off x="314325" y="1253331"/>
+            <a:ext cx="5181600" cy="4675982"/>
+          </a:xfrm>
+        </p:spPr>
+        <p:txBody>
+          <a:bodyPr>
+            <a:normAutofit/>
+          </a:bodyPr>
+          <a:lstStyle/>
+          <a:p>
+            <a:r>
+              <a:rPr lang="de-DE" sz="2000" dirty="0"/>
+              <a:t>Bei jedem Auto wird in seiner „</a:t>
+            </a:r>
+            <a:r>
+              <a:rPr lang="de-DE" sz="2000" dirty="0" err="1"/>
+              <a:t>RoadMap</a:t>
+            </a:r>
+            <a:r>
+              <a:rPr lang="de-DE" sz="2000" dirty="0"/>
+              <a:t>“ gelesen, wohin es fahren möchte, und dementsprechend wird der Blinker auf eine Richtung gesetzt</a:t>
+            </a:r>
+          </a:p>
+          <a:p>
+            <a:r>
+              <a:rPr lang="de-DE" sz="2000" dirty="0"/>
+              <a:t>Richtungen:</a:t>
+            </a:r>
+          </a:p>
+          <a:p>
+            <a:pPr lvl="1">
+              <a:buFont typeface="Wingdings" panose="05000000000000000000" pitchFamily="2" charset="2"/>
+              <a:buChar char="Ø"/>
+            </a:pPr>
+            <a:r>
+              <a:rPr lang="de-DE" sz="2000" dirty="0"/>
+              <a:t>Links (-1)</a:t>
+            </a:r>
+          </a:p>
+          <a:p>
+            <a:pPr lvl="1">
+              <a:buFont typeface="Wingdings" panose="05000000000000000000" pitchFamily="2" charset="2"/>
+              <a:buChar char="Ø"/>
+            </a:pPr>
+            <a:r>
+              <a:rPr lang="de-DE" sz="2000" dirty="0"/>
+              <a:t>Rechts (1)</a:t>
+            </a:r>
+          </a:p>
+          <a:p>
+            <a:pPr lvl="1">
+              <a:buFont typeface="Wingdings" panose="05000000000000000000" pitchFamily="2" charset="2"/>
+              <a:buChar char="Ø"/>
+            </a:pPr>
+            <a:r>
+              <a:rPr lang="de-DE" sz="2000" dirty="0"/>
+              <a:t>Gerade aus (0)</a:t>
+            </a:r>
+          </a:p>
+          <a:p>
+            <a:r>
+              <a:rPr lang="de-DE" sz="2000" dirty="0"/>
+              <a:t>So weiß die Kreuzung wohin Autos wollen </a:t>
+            </a:r>
+            <a:endParaRPr lang="de-IT" sz="2000" dirty="0"/>
+          </a:p>
+        </p:txBody>
+      </p:sp>
+    </p:spTree>
+    <p:extLst>
+      <p:ext uri="{BB962C8B-B14F-4D97-AF65-F5344CB8AC3E}">
+        <p14:creationId xmlns:p14="http://schemas.microsoft.com/office/powerpoint/2010/main" val="1460228131"/>
+      </p:ext>
+    </p:extLst>
+  </p:cSld>
+  <p:clrMapOvr>
+    <a:masterClrMapping/>
+  </p:clrMapOvr>
+</p:sld>
+</file>
+
+<file path=ppt/slides/slide9.xml><?xml version="1.0" encoding="utf-8"?>
+<p:sld xmlns:a="http://schemas.openxmlformats.org/drawingml/2006/main" xmlns:r="http://schemas.openxmlformats.org/officeDocument/2006/relationships" xmlns:p="http://schemas.openxmlformats.org/presentationml/2006/main">
+  <p:cSld>
+    <p:bg>
+      <p:bgPr>
+        <a:solidFill>
+          <a:schemeClr val="bg1"/>
+        </a:solidFill>
+        <a:effectLst/>
+      </p:bgPr>
+    </p:bg>
+    <p:spTree>
+      <p:nvGrpSpPr>
+        <p:cNvPr id="1" name=""/>
+        <p:cNvGrpSpPr/>
+        <p:nvPr/>
+      </p:nvGrpSpPr>
+      <p:grpSpPr>
+        <a:xfrm>
+          <a:off x="0" y="0"/>
+          <a:ext cx="0" cy="0"/>
+          <a:chOff x="0" y="0"/>
+          <a:chExt cx="0" cy="0"/>
+        </a:xfrm>
+      </p:grpSpPr>
+      <p:sp>
+        <p:nvSpPr>
+          <p:cNvPr id="2" name="Titel 1">
+            <a:extLst>
+              <a:ext uri="{FF2B5EF4-FFF2-40B4-BE49-F238E27FC236}">
+                <a16:creationId xmlns:a16="http://schemas.microsoft.com/office/drawing/2014/main" id="{3C99C246-1ED5-429C-ADA5-1DC34C6C1EFB}"/>
+              </a:ext>
+            </a:extLst>
+          </p:cNvPr>
+          <p:cNvSpPr>
+            <a:spLocks noGrp="1"/>
+          </p:cNvSpPr>
+          <p:nvPr>
+            <p:ph type="title"/>
+          </p:nvPr>
+        </p:nvSpPr>
+        <p:spPr>
+          <a:xfrm>
+            <a:off x="648930" y="629266"/>
+            <a:ext cx="3605572" cy="1676603"/>
+          </a:xfrm>
+        </p:spPr>
+        <p:txBody>
+          <a:bodyPr vert="horz" lIns="91440" tIns="45720" rIns="91440" bIns="45720" rtlCol="0" anchor="ctr">
+            <a:normAutofit/>
+          </a:bodyPr>
+          <a:lstStyle/>
+          <a:p>
+            <a:r>
+              <a:rPr lang="en-US" sz="4000"/>
+              <a:t>T-intersection-itself</a:t>
+            </a:r>
+          </a:p>
+        </p:txBody>
+      </p:sp>
+      <p:sp>
+        <p:nvSpPr>
+          <p:cNvPr id="3" name="Inhaltsplatzhalter 2">
+            <a:extLst>
+              <a:ext uri="{FF2B5EF4-FFF2-40B4-BE49-F238E27FC236}">
+                <a16:creationId xmlns:a16="http://schemas.microsoft.com/office/drawing/2014/main" id="{E98567BC-D705-4864-8CE4-3D87C1940404}"/>
+              </a:ext>
+            </a:extLst>
+          </p:cNvPr>
+          <p:cNvSpPr>
+            <a:spLocks noGrp="1"/>
+          </p:cNvSpPr>
+          <p:nvPr>
+            <p:ph sz="half" idx="1"/>
+          </p:nvPr>
+        </p:nvSpPr>
+        <p:spPr>
+          <a:xfrm>
+            <a:off x="648931" y="2143125"/>
+            <a:ext cx="3605571" cy="4074796"/>
+          </a:xfrm>
+        </p:spPr>
+        <p:txBody>
+          <a:bodyPr vert="horz" lIns="91440" tIns="45720" rIns="91440" bIns="45720" rtlCol="0">
+            <a:normAutofit/>
+          </a:bodyPr>
+          <a:lstStyle/>
+          <a:p>
+            <a:r>
+              <a:rPr lang="en-US" sz="2000" dirty="0"/>
+              <a:t>In der </a:t>
+            </a:r>
+            <a:r>
+              <a:rPr lang="en-US" sz="2000" dirty="0" err="1"/>
+              <a:t>Kreuzung</a:t>
+            </a:r>
+            <a:r>
+              <a:rPr lang="en-US" sz="2000" dirty="0"/>
+              <a:t> </a:t>
+            </a:r>
+            <a:r>
+              <a:rPr lang="en-US" sz="2000" dirty="0" err="1"/>
+              <a:t>selbst</a:t>
+            </a:r>
+            <a:r>
+              <a:rPr lang="en-US" sz="2000" dirty="0"/>
+              <a:t> </a:t>
+            </a:r>
+            <a:r>
+              <a:rPr lang="en-US" sz="2000" dirty="0" err="1"/>
+              <a:t>befinden</a:t>
+            </a:r>
+            <a:r>
+              <a:rPr lang="en-US" sz="2000" dirty="0"/>
+              <a:t> </a:t>
+            </a:r>
+            <a:r>
+              <a:rPr lang="en-US" sz="2000" dirty="0" err="1"/>
+              <a:t>sich</a:t>
+            </a:r>
+            <a:r>
+              <a:rPr lang="en-US" sz="2000" dirty="0"/>
+              <a:t> Queues an </a:t>
+            </a:r>
+            <a:r>
+              <a:rPr lang="en-US" sz="2000" dirty="0" err="1"/>
+              <a:t>allen</a:t>
+            </a:r>
+            <a:r>
+              <a:rPr lang="en-US" sz="2000" dirty="0"/>
+              <a:t> </a:t>
+            </a:r>
+            <a:r>
+              <a:rPr lang="en-US" sz="2000" dirty="0" err="1"/>
+              <a:t>Eingängen</a:t>
+            </a:r>
+            <a:r>
+              <a:rPr lang="en-US" sz="2000" dirty="0"/>
+              <a:t>, in die </a:t>
+            </a:r>
+            <a:r>
+              <a:rPr lang="en-US" sz="2000" dirty="0" err="1"/>
+              <a:t>die</a:t>
+            </a:r>
+            <a:r>
+              <a:rPr lang="en-US" sz="2000" dirty="0"/>
+              <a:t> Autos rein </a:t>
+            </a:r>
+            <a:r>
+              <a:rPr lang="en-US" sz="2000" dirty="0" err="1"/>
+              <a:t>kommen</a:t>
+            </a:r>
+            <a:r>
+              <a:rPr lang="en-US" sz="2000" dirty="0"/>
+              <a:t>, </a:t>
+            </a:r>
+            <a:r>
+              <a:rPr lang="en-US" sz="2000" dirty="0" err="1"/>
+              <a:t>sobald</a:t>
+            </a:r>
+            <a:r>
+              <a:rPr lang="en-US" sz="2000" dirty="0"/>
+              <a:t> </a:t>
+            </a:r>
+            <a:r>
+              <a:rPr lang="en-US" sz="2000" dirty="0" err="1"/>
+              <a:t>sie</a:t>
+            </a:r>
+            <a:r>
+              <a:rPr lang="en-US" sz="2000" dirty="0"/>
+              <a:t> </a:t>
+            </a:r>
+            <a:r>
+              <a:rPr lang="en-US" sz="2000" dirty="0" err="1"/>
+              <a:t>ankommen</a:t>
+            </a:r>
+            <a:endParaRPr lang="en-US" sz="2000" dirty="0"/>
+          </a:p>
+          <a:p>
+            <a:r>
+              <a:rPr lang="en-US" sz="2000" dirty="0" err="1"/>
+              <a:t>Viele</a:t>
+            </a:r>
+            <a:r>
+              <a:rPr lang="en-US" sz="2000" dirty="0"/>
+              <a:t> </a:t>
+            </a:r>
+            <a:r>
+              <a:rPr lang="en-US" sz="2000" dirty="0" err="1"/>
+              <a:t>verschiedene</a:t>
+            </a:r>
+            <a:r>
+              <a:rPr lang="en-US" sz="2000" dirty="0"/>
+              <a:t> Inputs/Outputs</a:t>
+            </a:r>
+          </a:p>
+          <a:p>
+            <a:r>
+              <a:rPr lang="en-US" sz="2000" dirty="0" err="1"/>
+              <a:t>Für</a:t>
+            </a:r>
+            <a:r>
+              <a:rPr lang="en-US" sz="2000" dirty="0"/>
+              <a:t> die </a:t>
+            </a:r>
+            <a:r>
+              <a:rPr lang="en-US" sz="2000" dirty="0" err="1"/>
+              <a:t>Analyse</a:t>
+            </a:r>
+            <a:r>
+              <a:rPr lang="en-US" sz="2000" dirty="0"/>
+              <a:t> </a:t>
+            </a:r>
+            <a:r>
+              <a:rPr lang="en-US" sz="2000" dirty="0" err="1"/>
+              <a:t>wird</a:t>
+            </a:r>
+            <a:r>
+              <a:rPr lang="en-US" sz="2000" dirty="0"/>
+              <a:t> </a:t>
+            </a:r>
+            <a:r>
+              <a:rPr lang="en-US" sz="2000" dirty="0" err="1"/>
+              <a:t>ein</a:t>
+            </a:r>
+            <a:r>
+              <a:rPr lang="en-US" sz="2000" dirty="0"/>
+              <a:t> Counter </a:t>
+            </a:r>
+            <a:r>
+              <a:rPr lang="en-US" sz="2000" dirty="0" err="1"/>
+              <a:t>mitgetragen</a:t>
+            </a:r>
+            <a:endParaRPr lang="en-US" sz="2000" dirty="0"/>
+          </a:p>
+          <a:p>
+            <a:r>
+              <a:rPr lang="en-US" sz="2000" dirty="0"/>
+              <a:t>„</a:t>
+            </a:r>
+            <a:r>
+              <a:rPr lang="en-US" sz="2000" dirty="0" err="1"/>
+              <a:t>right_hand_rule</a:t>
+            </a:r>
+            <a:r>
+              <a:rPr lang="en-US" sz="2000" dirty="0"/>
+              <a:t>()“ </a:t>
+            </a:r>
+            <a:r>
+              <a:rPr lang="en-US" sz="2000" dirty="0">
+                <a:sym typeface="Wingdings" panose="05000000000000000000" pitchFamily="2" charset="2"/>
+              </a:rPr>
+              <a:t> </a:t>
+            </a:r>
+            <a:r>
+              <a:rPr lang="en-US" sz="2000" dirty="0" err="1">
+                <a:sym typeface="Wingdings" panose="05000000000000000000" pitchFamily="2" charset="2"/>
+              </a:rPr>
+              <a:t>Methode</a:t>
+            </a:r>
+            <a:r>
+              <a:rPr lang="en-US" sz="2000" dirty="0">
+                <a:sym typeface="Wingdings" panose="05000000000000000000" pitchFamily="2" charset="2"/>
+              </a:rPr>
+              <a:t>, die </a:t>
+            </a:r>
+            <a:r>
+              <a:rPr lang="en-US" sz="2000" dirty="0" err="1">
+                <a:sym typeface="Wingdings" panose="05000000000000000000" pitchFamily="2" charset="2"/>
+              </a:rPr>
+              <a:t>die</a:t>
+            </a:r>
+            <a:r>
+              <a:rPr lang="en-US" sz="2000" dirty="0">
+                <a:sym typeface="Wingdings" panose="05000000000000000000" pitchFamily="2" charset="2"/>
+              </a:rPr>
+              <a:t> </a:t>
+            </a:r>
+            <a:r>
+              <a:rPr lang="en-US" sz="2000" dirty="0" err="1">
+                <a:sym typeface="Wingdings" panose="05000000000000000000" pitchFamily="2" charset="2"/>
+              </a:rPr>
+              <a:t>Rechts</a:t>
+            </a:r>
+            <a:r>
+              <a:rPr lang="en-US" sz="2000" dirty="0">
+                <a:sym typeface="Wingdings" panose="05000000000000000000" pitchFamily="2" charset="2"/>
+              </a:rPr>
+              <a:t>-Regel </a:t>
+            </a:r>
+            <a:r>
+              <a:rPr lang="en-US" sz="2000" dirty="0" err="1">
+                <a:sym typeface="Wingdings" panose="05000000000000000000" pitchFamily="2" charset="2"/>
+              </a:rPr>
+              <a:t>implementiert</a:t>
+            </a:r>
+            <a:endParaRPr lang="en-US" sz="2000" dirty="0"/>
+          </a:p>
+        </p:txBody>
+      </p:sp>
+      <p:sp>
+        <p:nvSpPr>
+          <p:cNvPr id="11" name="Rectangle 10">
+            <a:extLst>
+              <a:ext uri="{FF2B5EF4-FFF2-40B4-BE49-F238E27FC236}">
+                <a16:creationId xmlns:a16="http://schemas.microsoft.com/office/drawing/2014/main" id="{577D1452-F0B7-431E-9A24-D3F7103D8510}"/>
+              </a:ext>
+              <a:ext uri="{C183D7F6-B498-43B3-948B-1728B52AA6E4}">
+                <adec:decorative xmlns:adec="http://schemas.microsoft.com/office/drawing/2017/decorative" val="1"/>
+              </a:ext>
+            </a:extLst>
+          </p:cNvPr>
+          <p:cNvSpPr>
+            <a:spLocks noGrp="1" noRot="1" noChangeAspect="1" noMove="1" noResize="1" noEditPoints="1" noAdjustHandles="1" noChangeArrowheads="1" noChangeShapeType="1" noTextEdit="1"/>
+          </p:cNvSpPr>
+          <p:nvPr>
+            <p:extLst>
+              <p:ext uri="{386F3935-93C4-4BCD-93E2-E3B085C9AB24}">
+                <p16:designElem xmlns:p16="http://schemas.microsoft.com/office/powerpoint/2015/main" val="1"/>
+              </p:ext>
+            </p:extLst>
+          </p:nvPr>
+        </p:nvSpPr>
+        <p:spPr>
+          <a:xfrm>
+            <a:off x="4639056" y="0"/>
+            <a:ext cx="7552944" cy="6858000"/>
+          </a:xfrm>
+          <a:prstGeom prst="rect">
+            <a:avLst/>
+          </a:prstGeom>
+          <a:solidFill>
+            <a:srgbClr val="C8CACA"/>
+          </a:solidFill>
+          <a:ln>
+            <a:noFill/>
+          </a:ln>
+        </p:spPr>
+        <p:style>
+          <a:lnRef idx="2">
+            <a:schemeClr val="accent1">
+              <a:shade val="50000"/>
+            </a:schemeClr>
+          </a:lnRef>
+          <a:fillRef idx="1">
+            <a:schemeClr val="accent1"/>
+          </a:fillRef>
+          <a:effectRef idx="0">
+            <a:schemeClr val="accent1"/>
+          </a:effectRef>
+          <a:fontRef idx="minor">
+            <a:schemeClr val="lt1"/>
+          </a:fontRef>
+        </p:style>
+        <p:txBody>
+          <a:bodyPr rtlCol="0" anchor="ctr"/>
+          <a:lstStyle/>
+          <a:p>
+            <a:pPr algn="ctr"/>
+            <a:endParaRPr lang="en-US"/>
+          </a:p>
+        </p:txBody>
+      </p:sp>
+      <p:sp>
+        <p:nvSpPr>
+          <p:cNvPr id="13" name="Rounded Rectangle 20">
+            <a:extLst>
+              <a:ext uri="{FF2B5EF4-FFF2-40B4-BE49-F238E27FC236}">
+                <a16:creationId xmlns:a16="http://schemas.microsoft.com/office/drawing/2014/main" id="{A660F4F9-5DF5-4F15-BE6A-CD8648BB1148}"/>
+              </a:ext>
+              <a:ext uri="{C183D7F6-B498-43B3-948B-1728B52AA6E4}">
+                <adec:decorative xmlns:adec="http://schemas.microsoft.com/office/drawing/2017/decorative" val="1"/>
+              </a:ext>
+            </a:extLst>
+          </p:cNvPr>
+          <p:cNvSpPr>
+            <a:spLocks noGrp="1" noRot="1" noChangeAspect="1" noMove="1" noResize="1" noEditPoints="1" noAdjustHandles="1" noChangeArrowheads="1" noChangeShapeType="1" noTextEdit="1"/>
+          </p:cNvSpPr>
+          <p:nvPr>
+            <p:extLst>
+              <p:ext uri="{386F3935-93C4-4BCD-93E2-E3B085C9AB24}">
+                <p16:designElem xmlns:p16="http://schemas.microsoft.com/office/powerpoint/2015/main" val="1"/>
+              </p:ext>
+            </p:extLst>
+          </p:nvPr>
+        </p:nvSpPr>
+        <p:spPr>
+          <a:xfrm>
+            <a:off x="5118267" y="559407"/>
+            <a:ext cx="6594522" cy="5739187"/>
+          </a:xfrm>
+          <a:prstGeom prst="roundRect">
+            <a:avLst>
+              <a:gd name="adj" fmla="val 0"/>
+            </a:avLst>
+          </a:prstGeom>
+          <a:solidFill>
+            <a:srgbClr val="FFFFFF"/>
+          </a:solidFill>
+          <a:ln w="9525">
+            <a:solidFill>
+              <a:srgbClr val="C8CACA"/>
+            </a:solidFill>
+          </a:ln>
+          <a:effectLst>
+            <a:outerShdw blurRad="57150" dist="19050" dir="5400000" algn="t" rotWithShape="0">
+              <a:prstClr val="black">
+                <a:alpha val="63000"/>
+              </a:prstClr>
+            </a:outerShdw>
+          </a:effectLst>
+        </p:spPr>
+        <p:style>
+          <a:lnRef idx="2">
+            <a:schemeClr val="accent1">
+              <a:shade val="50000"/>
+            </a:schemeClr>
+          </a:lnRef>
+          <a:fillRef idx="1">
+            <a:schemeClr val="accent1"/>
+          </a:fillRef>
+          <a:effectRef idx="0">
+            <a:schemeClr val="accent1"/>
+          </a:effectRef>
+          <a:fontRef idx="minor">
+            <a:schemeClr val="lt1"/>
+          </a:fontRef>
+        </p:style>
+        <p:txBody>
+          <a:bodyPr rtlCol="0" anchor="ctr"/>
+          <a:lstStyle/>
+          <a:p>
+            <a:pPr algn="ctr"/>
+            <a:endParaRPr lang="en-US"/>
+          </a:p>
+        </p:txBody>
+      </p:sp>
+      <p:pic>
+        <p:nvPicPr>
+          <p:cNvPr id="6" name="Inhaltsplatzhalter 5">
+            <a:extLst>
+              <a:ext uri="{FF2B5EF4-FFF2-40B4-BE49-F238E27FC236}">
+                <a16:creationId xmlns:a16="http://schemas.microsoft.com/office/drawing/2014/main" id="{0B518E93-2540-43E6-BD4B-6A38FF9F3B73}"/>
+              </a:ext>
+            </a:extLst>
+          </p:cNvPr>
+          <p:cNvPicPr>
+            <a:picLocks noGrp="1" noChangeAspect="1"/>
+          </p:cNvPicPr>
+          <p:nvPr>
+            <p:ph sz="half" idx="2"/>
+          </p:nvPr>
+        </p:nvPicPr>
+        <p:blipFill rotWithShape="1">
+          <a:blip r:embed="rId2"/>
+          <a:srcRect t="7223" r="-1" b="17760"/>
+          <a:stretch/>
+        </p:blipFill>
+        <p:spPr>
+          <a:xfrm>
+            <a:off x="5283708" y="722376"/>
+            <a:ext cx="6263640" cy="5413248"/>
+          </a:xfrm>
+          <a:prstGeom prst="rect">
+            <a:avLst/>
+          </a:prstGeom>
+          <a:effectLst/>
+        </p:spPr>
+      </p:pic>
+    </p:spTree>
+    <p:extLst>
+      <p:ext uri="{BB962C8B-B14F-4D97-AF65-F5344CB8AC3E}">
+        <p14:creationId xmlns:p14="http://schemas.microsoft.com/office/powerpoint/2010/main" val="47323300"/>
       </p:ext>
     </p:extLst>
   </p:cSld>

</xml_diff>

<commit_message>
deleted the unnessesary stuff
</commit_message>
<xml_diff>
--- a/Presentation/Traffic-flow-modeling-and-analysis.pptx
+++ b/Presentation/Traffic-flow-modeling-and-analysis.pptx
@@ -3202,7 +3202,7 @@
           <a:p>
             <a:fld id="{2CE709E5-6494-42E6-9F3E-1EC649FF95E6}" type="datetimeFigureOut">
               <a:rPr lang="de-DE" smtClean="0"/>
-              <a:t>28.01.2021</a:t>
+              <a:t>01.02.2021</a:t>
             </a:fld>
             <a:endParaRPr lang="de-DE"/>
           </a:p>
@@ -3400,7 +3400,7 @@
           <a:p>
             <a:fld id="{2CE709E5-6494-42E6-9F3E-1EC649FF95E6}" type="datetimeFigureOut">
               <a:rPr lang="de-DE" smtClean="0"/>
-              <a:t>28.01.2021</a:t>
+              <a:t>01.02.2021</a:t>
             </a:fld>
             <a:endParaRPr lang="de-DE"/>
           </a:p>
@@ -3608,7 +3608,7 @@
           <a:p>
             <a:fld id="{2CE709E5-6494-42E6-9F3E-1EC649FF95E6}" type="datetimeFigureOut">
               <a:rPr lang="de-DE" smtClean="0"/>
-              <a:t>28.01.2021</a:t>
+              <a:t>01.02.2021</a:t>
             </a:fld>
             <a:endParaRPr lang="de-DE"/>
           </a:p>
@@ -3806,7 +3806,7 @@
           <a:p>
             <a:fld id="{2CE709E5-6494-42E6-9F3E-1EC649FF95E6}" type="datetimeFigureOut">
               <a:rPr lang="de-DE" smtClean="0"/>
-              <a:t>28.01.2021</a:t>
+              <a:t>01.02.2021</a:t>
             </a:fld>
             <a:endParaRPr lang="de-DE"/>
           </a:p>
@@ -4081,7 +4081,7 @@
           <a:p>
             <a:fld id="{2CE709E5-6494-42E6-9F3E-1EC649FF95E6}" type="datetimeFigureOut">
               <a:rPr lang="de-DE" smtClean="0"/>
-              <a:t>28.01.2021</a:t>
+              <a:t>01.02.2021</a:t>
             </a:fld>
             <a:endParaRPr lang="de-DE"/>
           </a:p>
@@ -4346,7 +4346,7 @@
           <a:p>
             <a:fld id="{2CE709E5-6494-42E6-9F3E-1EC649FF95E6}" type="datetimeFigureOut">
               <a:rPr lang="de-DE" smtClean="0"/>
-              <a:t>28.01.2021</a:t>
+              <a:t>01.02.2021</a:t>
             </a:fld>
             <a:endParaRPr lang="de-DE"/>
           </a:p>
@@ -4758,7 +4758,7 @@
           <a:p>
             <a:fld id="{2CE709E5-6494-42E6-9F3E-1EC649FF95E6}" type="datetimeFigureOut">
               <a:rPr lang="de-DE" smtClean="0"/>
-              <a:t>28.01.2021</a:t>
+              <a:t>01.02.2021</a:t>
             </a:fld>
             <a:endParaRPr lang="de-DE"/>
           </a:p>
@@ -4899,7 +4899,7 @@
           <a:p>
             <a:fld id="{2CE709E5-6494-42E6-9F3E-1EC649FF95E6}" type="datetimeFigureOut">
               <a:rPr lang="de-DE" smtClean="0"/>
-              <a:t>28.01.2021</a:t>
+              <a:t>01.02.2021</a:t>
             </a:fld>
             <a:endParaRPr lang="de-DE"/>
           </a:p>
@@ -5012,7 +5012,7 @@
           <a:p>
             <a:fld id="{2CE709E5-6494-42E6-9F3E-1EC649FF95E6}" type="datetimeFigureOut">
               <a:rPr lang="de-DE" smtClean="0"/>
-              <a:t>28.01.2021</a:t>
+              <a:t>01.02.2021</a:t>
             </a:fld>
             <a:endParaRPr lang="de-DE"/>
           </a:p>
@@ -5323,7 +5323,7 @@
           <a:p>
             <a:fld id="{2CE709E5-6494-42E6-9F3E-1EC649FF95E6}" type="datetimeFigureOut">
               <a:rPr lang="de-DE" smtClean="0"/>
-              <a:t>28.01.2021</a:t>
+              <a:t>01.02.2021</a:t>
             </a:fld>
             <a:endParaRPr lang="de-DE"/>
           </a:p>
@@ -5611,7 +5611,7 @@
           <a:p>
             <a:fld id="{2CE709E5-6494-42E6-9F3E-1EC649FF95E6}" type="datetimeFigureOut">
               <a:rPr lang="de-DE" smtClean="0"/>
-              <a:t>28.01.2021</a:t>
+              <a:t>01.02.2021</a:t>
             </a:fld>
             <a:endParaRPr lang="de-DE"/>
           </a:p>
@@ -5852,7 +5852,7 @@
           <a:p>
             <a:fld id="{2CE709E5-6494-42E6-9F3E-1EC649FF95E6}" type="datetimeFigureOut">
               <a:rPr lang="de-DE" smtClean="0"/>
-              <a:t>28.01.2021</a:t>
+              <a:t>01.02.2021</a:t>
             </a:fld>
             <a:endParaRPr lang="de-DE"/>
           </a:p>
@@ -16739,7 +16739,7 @@
         </p:spPr>
         <p:txBody>
           <a:bodyPr anchor="ctr">
-            <a:normAutofit/>
+            <a:normAutofit lnSpcReduction="10000"/>
           </a:bodyPr>
           <a:lstStyle/>
           <a:p>
@@ -16779,7 +16779,7 @@
             </a:r>
             <a:r>
               <a:rPr lang="de-DE" sz="2000" dirty="0" err="1"/>
-              <a:t>PoissonClock</a:t>
+              <a:t>DiscreteClock</a:t>
             </a:r>
             <a:r>
               <a:rPr lang="de-DE" sz="2000" dirty="0"/>
@@ -16793,12 +16793,12 @@
               <a:t>Sendet zu </a:t>
             </a:r>
             <a:r>
-              <a:rPr lang="de-DE" sz="2000" dirty="0" err="1"/>
-              <a:t>random</a:t>
+              <a:rPr lang="de-DE" sz="2000"/>
+              <a:t>einer bestimmten Zeiten </a:t>
             </a:r>
             <a:r>
               <a:rPr lang="de-DE" sz="2000" dirty="0"/>
-              <a:t> Zeiten ein Signal</a:t>
+              <a:t>ein Signal</a:t>
             </a:r>
           </a:p>
           <a:p>

</xml_diff>